<commit_message>
scripts updated for v6 training image
</commit_message>
<xml_diff>
--- a/Slides/3. Query Execution.pptx
+++ b/Slides/3. Query Execution.pptx
@@ -5,48 +5,49 @@
     <p:sldMasterId id="2147483678" r:id="rId1"/>
   </p:sldMasterIdLst>
   <p:notesMasterIdLst>
-    <p:notesMasterId r:id="rId41"/>
+    <p:notesMasterId r:id="rId42"/>
   </p:notesMasterIdLst>
   <p:sldIdLst>
     <p:sldId id="256" r:id="rId2"/>
     <p:sldId id="284" r:id="rId3"/>
-    <p:sldId id="288" r:id="rId4"/>
-    <p:sldId id="299" r:id="rId5"/>
-    <p:sldId id="281" r:id="rId6"/>
-    <p:sldId id="257" r:id="rId7"/>
-    <p:sldId id="276" r:id="rId8"/>
-    <p:sldId id="277" r:id="rId9"/>
-    <p:sldId id="258" r:id="rId10"/>
-    <p:sldId id="280" r:id="rId11"/>
-    <p:sldId id="259" r:id="rId12"/>
-    <p:sldId id="283" r:id="rId13"/>
-    <p:sldId id="289" r:id="rId14"/>
-    <p:sldId id="264" r:id="rId15"/>
-    <p:sldId id="297" r:id="rId16"/>
-    <p:sldId id="287" r:id="rId17"/>
-    <p:sldId id="279" r:id="rId18"/>
-    <p:sldId id="278" r:id="rId19"/>
-    <p:sldId id="265" r:id="rId20"/>
-    <p:sldId id="286" r:id="rId21"/>
-    <p:sldId id="298" r:id="rId22"/>
-    <p:sldId id="285" r:id="rId23"/>
-    <p:sldId id="296" r:id="rId24"/>
-    <p:sldId id="300" r:id="rId25"/>
-    <p:sldId id="273" r:id="rId26"/>
-    <p:sldId id="271" r:id="rId27"/>
-    <p:sldId id="290" r:id="rId28"/>
-    <p:sldId id="301" r:id="rId29"/>
-    <p:sldId id="260" r:id="rId30"/>
-    <p:sldId id="263" r:id="rId31"/>
-    <p:sldId id="292" r:id="rId32"/>
-    <p:sldId id="275" r:id="rId33"/>
-    <p:sldId id="294" r:id="rId34"/>
-    <p:sldId id="293" r:id="rId35"/>
-    <p:sldId id="269" r:id="rId36"/>
-    <p:sldId id="302" r:id="rId37"/>
-    <p:sldId id="270" r:id="rId38"/>
-    <p:sldId id="291" r:id="rId39"/>
-    <p:sldId id="274" r:id="rId40"/>
+    <p:sldId id="304" r:id="rId4"/>
+    <p:sldId id="288" r:id="rId5"/>
+    <p:sldId id="299" r:id="rId6"/>
+    <p:sldId id="281" r:id="rId7"/>
+    <p:sldId id="257" r:id="rId8"/>
+    <p:sldId id="276" r:id="rId9"/>
+    <p:sldId id="277" r:id="rId10"/>
+    <p:sldId id="258" r:id="rId11"/>
+    <p:sldId id="280" r:id="rId12"/>
+    <p:sldId id="259" r:id="rId13"/>
+    <p:sldId id="283" r:id="rId14"/>
+    <p:sldId id="289" r:id="rId15"/>
+    <p:sldId id="264" r:id="rId16"/>
+    <p:sldId id="297" r:id="rId17"/>
+    <p:sldId id="287" r:id="rId18"/>
+    <p:sldId id="279" r:id="rId19"/>
+    <p:sldId id="278" r:id="rId20"/>
+    <p:sldId id="265" r:id="rId21"/>
+    <p:sldId id="286" r:id="rId22"/>
+    <p:sldId id="298" r:id="rId23"/>
+    <p:sldId id="285" r:id="rId24"/>
+    <p:sldId id="296" r:id="rId25"/>
+    <p:sldId id="300" r:id="rId26"/>
+    <p:sldId id="273" r:id="rId27"/>
+    <p:sldId id="271" r:id="rId28"/>
+    <p:sldId id="290" r:id="rId29"/>
+    <p:sldId id="301" r:id="rId30"/>
+    <p:sldId id="260" r:id="rId31"/>
+    <p:sldId id="263" r:id="rId32"/>
+    <p:sldId id="292" r:id="rId33"/>
+    <p:sldId id="275" r:id="rId34"/>
+    <p:sldId id="294" r:id="rId35"/>
+    <p:sldId id="293" r:id="rId36"/>
+    <p:sldId id="269" r:id="rId37"/>
+    <p:sldId id="302" r:id="rId38"/>
+    <p:sldId id="303" r:id="rId39"/>
+    <p:sldId id="291" r:id="rId40"/>
+    <p:sldId id="274" r:id="rId41"/>
   </p:sldIdLst>
   <p:sldSz cx="12192000" cy="6858000"/>
   <p:notesSz cx="6858000" cy="9144000"/>
@@ -152,6 +153,7 @@
           <p14:sldIdLst>
             <p14:sldId id="256"/>
             <p14:sldId id="284"/>
+            <p14:sldId id="304"/>
             <p14:sldId id="288"/>
             <p14:sldId id="299"/>
             <p14:sldId id="281"/>
@@ -194,7 +196,7 @@
             <p14:sldId id="293"/>
             <p14:sldId id="269"/>
             <p14:sldId id="302"/>
-            <p14:sldId id="270"/>
+            <p14:sldId id="303"/>
           </p14:sldIdLst>
         </p14:section>
         <p14:section name="Forcing and Hints" id="{309A4193-68B1-4BD5-B3F2-6A397BEBDD38}">
@@ -7670,7 +7672,7 @@
           <a:p>
             <a:fld id="{C07FE611-E342-4944-80A8-F7B4C421E4DD}" type="slidenum">
               <a:rPr lang="en-GB" smtClean="0"/>
-              <a:t>5</a:t>
+              <a:t>6</a:t>
             </a:fld>
             <a:endParaRPr lang="en-GB"/>
           </a:p>
@@ -7770,7 +7772,7 @@
           <a:p>
             <a:fld id="{C07FE611-E342-4944-80A8-F7B4C421E4DD}" type="slidenum">
               <a:rPr lang="en-GB" smtClean="0"/>
-              <a:t>12</a:t>
+              <a:t>13</a:t>
             </a:fld>
             <a:endParaRPr lang="en-GB"/>
           </a:p>
@@ -7835,7 +7837,54 @@
           <a:p>
             <a:r>
               <a:rPr lang="en-GB" dirty="0" smtClean="0"/>
-              <a:t>During this demo explain the parts of the query plan</a:t>
+              <a:t>During this demo explain the parts of the query </a:t>
+            </a:r>
+            <a:r>
+              <a:rPr lang="en-GB" dirty="0" smtClean="0"/>
+              <a:t>plan</a:t>
+            </a:r>
+          </a:p>
+          <a:p>
+            <a:endParaRPr lang="en-GB" dirty="0" smtClean="0"/>
+          </a:p>
+          <a:p>
+            <a:r>
+              <a:rPr lang="en-GB" dirty="0" smtClean="0"/>
+              <a:t>DBCC SHOW STATS:</a:t>
+            </a:r>
+          </a:p>
+          <a:p>
+            <a:r>
+              <a:rPr lang="en-GB" dirty="0" smtClean="0"/>
+              <a:t>RANGE_HI_KEY – Upper bound of the key value</a:t>
+            </a:r>
+          </a:p>
+          <a:p>
+            <a:r>
+              <a:rPr lang="en-GB" dirty="0" smtClean="0"/>
+              <a:t>RANGE_ROWS</a:t>
+            </a:r>
+            <a:r>
+              <a:rPr lang="en-GB" baseline="0" dirty="0" smtClean="0"/>
+              <a:t> – Estimated number of rows in range (excluding key)</a:t>
+            </a:r>
+          </a:p>
+          <a:p>
+            <a:r>
+              <a:rPr lang="en-GB" baseline="0" dirty="0" smtClean="0"/>
+              <a:t>EQ_ROW – Estimated number of matching rows</a:t>
+            </a:r>
+          </a:p>
+          <a:p>
+            <a:r>
+              <a:rPr lang="en-GB" baseline="0" dirty="0" smtClean="0"/>
+              <a:t>DISTINCT_RANGE – Estimated number of distinct values in range (excluding key)</a:t>
+            </a:r>
+          </a:p>
+          <a:p>
+            <a:r>
+              <a:rPr lang="en-GB" baseline="0" dirty="0" smtClean="0"/>
+              <a:t>AVG_RANGE_ROWS – Average number of duplicates</a:t>
             </a:r>
             <a:endParaRPr lang="en-GB" dirty="0"/>
           </a:p>
@@ -7858,7 +7907,7 @@
           <a:p>
             <a:fld id="{C07FE611-E342-4944-80A8-F7B4C421E4DD}" type="slidenum">
               <a:rPr lang="en-GB" smtClean="0"/>
-              <a:t>13</a:t>
+              <a:t>14</a:t>
             </a:fld>
             <a:endParaRPr lang="en-GB"/>
           </a:p>
@@ -7982,7 +8031,7 @@
             <a:fld id="{B55B88FD-84B2-43BD-86AA-E2E5C0B76984}" type="slidenum">
               <a:rPr lang="en-GB" smtClean="0"/>
               <a:pPr/>
-              <a:t>18</a:t>
+              <a:t>19</a:t>
             </a:fld>
             <a:endParaRPr lang="en-GB"/>
           </a:p>
@@ -8108,7 +8157,7 @@
           <a:p>
             <a:fld id="{C07FE611-E342-4944-80A8-F7B4C421E4DD}" type="slidenum">
               <a:rPr lang="en-GB" smtClean="0"/>
-              <a:t>33</a:t>
+              <a:t>34</a:t>
             </a:fld>
             <a:endParaRPr lang="en-GB"/>
           </a:p>
@@ -8192,7 +8241,7 @@
           <a:p>
             <a:fld id="{C07FE611-E342-4944-80A8-F7B4C421E4DD}" type="slidenum">
               <a:rPr lang="en-GB" smtClean="0"/>
-              <a:t>34</a:t>
+              <a:t>35</a:t>
             </a:fld>
             <a:endParaRPr lang="en-GB"/>
           </a:p>
@@ -14184,6 +14233,119 @@
           <a:p>
             <a:r>
               <a:rPr lang="en-GB" dirty="0" smtClean="0"/>
+              <a:t>Building a Plan</a:t>
+            </a:r>
+            <a:endParaRPr lang="en-GB" dirty="0"/>
+          </a:p>
+        </p:txBody>
+      </p:sp>
+      <p:sp>
+        <p:nvSpPr>
+          <p:cNvPr id="3" name="Content Placeholder 2"/>
+          <p:cNvSpPr>
+            <a:spLocks noGrp="1"/>
+          </p:cNvSpPr>
+          <p:nvPr>
+            <p:ph idx="1"/>
+          </p:nvPr>
+        </p:nvSpPr>
+        <p:spPr/>
+        <p:txBody>
+          <a:bodyPr/>
+          <a:lstStyle/>
+          <a:p>
+            <a:r>
+              <a:rPr lang="en-GB" dirty="0" smtClean="0"/>
+              <a:t>Seek vs Scan</a:t>
+            </a:r>
+          </a:p>
+          <a:p>
+            <a:r>
+              <a:rPr lang="en-GB" dirty="0" smtClean="0"/>
+              <a:t>Choosing an Index</a:t>
+            </a:r>
+          </a:p>
+          <a:p>
+            <a:pPr lvl="1"/>
+            <a:r>
+              <a:rPr lang="en-GB" dirty="0" smtClean="0"/>
+              <a:t>Cardinality</a:t>
+            </a:r>
+          </a:p>
+          <a:p>
+            <a:r>
+              <a:rPr lang="en-GB" dirty="0" smtClean="0"/>
+              <a:t>Covering vs Non Covering</a:t>
+            </a:r>
+          </a:p>
+          <a:p>
+            <a:r>
+              <a:rPr lang="en-GB" dirty="0" smtClean="0"/>
+              <a:t>Filtered Indexes</a:t>
+            </a:r>
+          </a:p>
+          <a:p>
+            <a:endParaRPr lang="en-GB" dirty="0" smtClean="0"/>
+          </a:p>
+          <a:p>
+            <a:endParaRPr lang="en-GB" dirty="0"/>
+          </a:p>
+        </p:txBody>
+      </p:sp>
+    </p:spTree>
+    <p:extLst>
+      <p:ext uri="{BB962C8B-B14F-4D97-AF65-F5344CB8AC3E}">
+        <p14:creationId xmlns:p14="http://schemas.microsoft.com/office/powerpoint/2010/main" val="2914966170"/>
+      </p:ext>
+    </p:extLst>
+  </p:cSld>
+  <p:clrMapOvr>
+    <a:masterClrMapping/>
+  </p:clrMapOvr>
+  <p:timing>
+    <p:tnLst>
+      <p:par>
+        <p:cTn id="1" dur="indefinite" restart="never" nodeType="tmRoot"/>
+      </p:par>
+    </p:tnLst>
+  </p:timing>
+</p:sld>
+</file>
+
+<file path=ppt/slides/slide11.xml><?xml version="1.0" encoding="utf-8"?>
+<p:sld xmlns:a="http://schemas.openxmlformats.org/drawingml/2006/main" xmlns:r="http://schemas.openxmlformats.org/officeDocument/2006/relationships" xmlns:p="http://schemas.openxmlformats.org/presentationml/2006/main">
+  <p:cSld>
+    <p:spTree>
+      <p:nvGrpSpPr>
+        <p:cNvPr id="1" name=""/>
+        <p:cNvGrpSpPr/>
+        <p:nvPr/>
+      </p:nvGrpSpPr>
+      <p:grpSpPr>
+        <a:xfrm>
+          <a:off x="0" y="0"/>
+          <a:ext cx="0" cy="0"/>
+          <a:chOff x="0" y="0"/>
+          <a:chExt cx="0" cy="0"/>
+        </a:xfrm>
+      </p:grpSpPr>
+      <p:sp>
+        <p:nvSpPr>
+          <p:cNvPr id="2" name="Title 1"/>
+          <p:cNvSpPr>
+            <a:spLocks noGrp="1"/>
+          </p:cNvSpPr>
+          <p:nvPr>
+            <p:ph type="title"/>
+          </p:nvPr>
+        </p:nvSpPr>
+        <p:spPr/>
+        <p:txBody>
+          <a:bodyPr/>
+          <a:lstStyle/>
+          <a:p>
+            <a:r>
+              <a:rPr lang="en-GB" dirty="0" smtClean="0"/>
               <a:t>Estimates</a:t>
             </a:r>
             <a:endParaRPr lang="en-GB" dirty="0"/>
@@ -14273,130 +14435,6 @@
 </p:sld>
 </file>
 
-<file path=ppt/slides/slide11.xml><?xml version="1.0" encoding="utf-8"?>
-<p:sld xmlns:a="http://schemas.openxmlformats.org/drawingml/2006/main" xmlns:r="http://schemas.openxmlformats.org/officeDocument/2006/relationships" xmlns:p="http://schemas.openxmlformats.org/presentationml/2006/main">
-  <p:cSld>
-    <p:spTree>
-      <p:nvGrpSpPr>
-        <p:cNvPr id="1" name=""/>
-        <p:cNvGrpSpPr/>
-        <p:nvPr/>
-      </p:nvGrpSpPr>
-      <p:grpSpPr>
-        <a:xfrm>
-          <a:off x="0" y="0"/>
-          <a:ext cx="0" cy="0"/>
-          <a:chOff x="0" y="0"/>
-          <a:chExt cx="0" cy="0"/>
-        </a:xfrm>
-      </p:grpSpPr>
-      <p:sp>
-        <p:nvSpPr>
-          <p:cNvPr id="2" name="Title 1"/>
-          <p:cNvSpPr>
-            <a:spLocks noGrp="1"/>
-          </p:cNvSpPr>
-          <p:nvPr>
-            <p:ph type="title"/>
-          </p:nvPr>
-        </p:nvSpPr>
-        <p:spPr/>
-        <p:txBody>
-          <a:bodyPr/>
-          <a:lstStyle/>
-          <a:p>
-            <a:r>
-              <a:rPr lang="en-GB" dirty="0" smtClean="0"/>
-              <a:t>Statistics</a:t>
-            </a:r>
-            <a:endParaRPr lang="en-GB" dirty="0"/>
-          </a:p>
-        </p:txBody>
-      </p:sp>
-      <p:sp>
-        <p:nvSpPr>
-          <p:cNvPr id="3" name="Content Placeholder 2"/>
-          <p:cNvSpPr>
-            <a:spLocks noGrp="1"/>
-          </p:cNvSpPr>
-          <p:nvPr>
-            <p:ph idx="1"/>
-          </p:nvPr>
-        </p:nvSpPr>
-        <p:spPr/>
-        <p:txBody>
-          <a:bodyPr/>
-          <a:lstStyle/>
-          <a:p>
-            <a:r>
-              <a:rPr lang="en-GB" dirty="0" smtClean="0"/>
-              <a:t>Histogram of column(s) contents</a:t>
-            </a:r>
-          </a:p>
-          <a:p>
-            <a:r>
-              <a:rPr lang="en-GB" dirty="0" smtClean="0"/>
-              <a:t>Calculates the cardinality of a column (uniqueness of values)</a:t>
-            </a:r>
-          </a:p>
-          <a:p>
-            <a:r>
-              <a:rPr lang="en-GB" dirty="0" smtClean="0"/>
-              <a:t>Estimated from a sample (usually)</a:t>
-            </a:r>
-          </a:p>
-          <a:p>
-            <a:r>
-              <a:rPr lang="en-GB" dirty="0" smtClean="0"/>
-              <a:t>Always exist for indexes</a:t>
-            </a:r>
-          </a:p>
-          <a:p>
-            <a:r>
-              <a:rPr lang="en-GB" dirty="0" smtClean="0"/>
-              <a:t>Auto generated (usually) on other columns if used as predicates</a:t>
-            </a:r>
-          </a:p>
-          <a:p>
-            <a:r>
-              <a:rPr lang="en-GB" dirty="0" smtClean="0"/>
-              <a:t>Never auto generated on multiple columns (except indexes)</a:t>
-            </a:r>
-          </a:p>
-          <a:p>
-            <a:r>
-              <a:rPr lang="en-GB" dirty="0" smtClean="0"/>
-              <a:t>Manually update with UPDATE STATISTICS</a:t>
-            </a:r>
-          </a:p>
-          <a:p>
-            <a:pPr marL="0" indent="0">
-              <a:buNone/>
-            </a:pPr>
-            <a:endParaRPr lang="en-GB" dirty="0"/>
-          </a:p>
-        </p:txBody>
-      </p:sp>
-    </p:spTree>
-    <p:extLst>
-      <p:ext uri="{BB962C8B-B14F-4D97-AF65-F5344CB8AC3E}">
-        <p14:creationId xmlns:p14="http://schemas.microsoft.com/office/powerpoint/2010/main" val="2109371678"/>
-      </p:ext>
-    </p:extLst>
-  </p:cSld>
-  <p:clrMapOvr>
-    <a:masterClrMapping/>
-  </p:clrMapOvr>
-  <p:timing>
-    <p:tnLst>
-      <p:par>
-        <p:cTn id="1" dur="indefinite" restart="never" nodeType="tmRoot"/>
-      </p:par>
-    </p:tnLst>
-  </p:timing>
-</p:sld>
-</file>
-
 <file path=ppt/slides/slide12.xml><?xml version="1.0" encoding="utf-8"?>
 <p:sld xmlns:a="http://schemas.openxmlformats.org/drawingml/2006/main" xmlns:r="http://schemas.openxmlformats.org/officeDocument/2006/relationships" xmlns:p="http://schemas.openxmlformats.org/presentationml/2006/main">
   <p:cSld>
@@ -14431,41 +14469,80 @@
           <a:p>
             <a:r>
               <a:rPr lang="en-GB" dirty="0" smtClean="0"/>
-              <a:t>Statistics Histogram</a:t>
+              <a:t>Statistics</a:t>
             </a:r>
             <a:endParaRPr lang="en-GB" dirty="0"/>
           </a:p>
         </p:txBody>
       </p:sp>
-      <p:graphicFrame>
-        <p:nvGraphicFramePr>
-          <p:cNvPr id="4" name="Content Placeholder 3"/>
-          <p:cNvGraphicFramePr>
-            <a:graphicFrameLocks noGrp="1"/>
-          </p:cNvGraphicFramePr>
+      <p:sp>
+        <p:nvSpPr>
+          <p:cNvPr id="3" name="Content Placeholder 2"/>
+          <p:cNvSpPr>
+            <a:spLocks noGrp="1"/>
+          </p:cNvSpPr>
           <p:nvPr>
             <p:ph idx="1"/>
-            <p:extLst>
-              <p:ext uri="{D42A27DB-BD31-4B8C-83A1-F6EECF244321}">
-                <p14:modId xmlns:p14="http://schemas.microsoft.com/office/powerpoint/2010/main" val="2035612574"/>
-              </p:ext>
-            </p:extLst>
-          </p:nvPr>
-        </p:nvGraphicFramePr>
-        <p:xfrm>
-          <a:off x="685800" y="1576388"/>
-          <a:ext cx="10131425" cy="4221162"/>
-        </p:xfrm>
-        <a:graphic>
-          <a:graphicData uri="http://schemas.openxmlformats.org/drawingml/2006/chart">
-            <c:chart xmlns:c="http://schemas.openxmlformats.org/drawingml/2006/chart" xmlns:r="http://schemas.openxmlformats.org/officeDocument/2006/relationships" r:id="rId3"/>
-          </a:graphicData>
-        </a:graphic>
-      </p:graphicFrame>
+          </p:nvPr>
+        </p:nvSpPr>
+        <p:spPr/>
+        <p:txBody>
+          <a:bodyPr/>
+          <a:lstStyle/>
+          <a:p>
+            <a:r>
+              <a:rPr lang="en-GB" dirty="0" smtClean="0"/>
+              <a:t>Histogram of column(s) contents</a:t>
+            </a:r>
+          </a:p>
+          <a:p>
+            <a:r>
+              <a:rPr lang="en-GB" dirty="0" smtClean="0"/>
+              <a:t>Calculates the cardinality of a column (uniqueness of values)</a:t>
+            </a:r>
+          </a:p>
+          <a:p>
+            <a:r>
+              <a:rPr lang="en-GB" dirty="0" smtClean="0"/>
+              <a:t>Estimated from a sample (usually)</a:t>
+            </a:r>
+          </a:p>
+          <a:p>
+            <a:r>
+              <a:rPr lang="en-GB" dirty="0" smtClean="0"/>
+              <a:t>Always exist for indexes</a:t>
+            </a:r>
+          </a:p>
+          <a:p>
+            <a:r>
+              <a:rPr lang="en-GB" dirty="0" smtClean="0"/>
+              <a:t>Auto generated (usually) on other columns if used as predicates</a:t>
+            </a:r>
+          </a:p>
+          <a:p>
+            <a:r>
+              <a:rPr lang="en-GB" dirty="0" smtClean="0"/>
+              <a:t>Never auto generated on multiple columns (except indexes)</a:t>
+            </a:r>
+          </a:p>
+          <a:p>
+            <a:r>
+              <a:rPr lang="en-GB" dirty="0" smtClean="0"/>
+              <a:t>Manually update with UPDATE STATISTICS</a:t>
+            </a:r>
+          </a:p>
+          <a:p>
+            <a:pPr marL="0" indent="0">
+              <a:buNone/>
+            </a:pPr>
+            <a:endParaRPr lang="en-GB" dirty="0"/>
+          </a:p>
+        </p:txBody>
+      </p:sp>
     </p:spTree>
     <p:extLst>
       <p:ext uri="{BB962C8B-B14F-4D97-AF65-F5344CB8AC3E}">
-        <p14:creationId xmlns:p14="http://schemas.microsoft.com/office/powerpoint/2010/main" val="4145581422"/>
+        <p14:creationId xmlns:p14="http://schemas.microsoft.com/office/powerpoint/2010/main" val="2109371678"/>
       </p:ext>
     </p:extLst>
   </p:cSld>
@@ -14516,35 +14593,41 @@
           <a:p>
             <a:r>
               <a:rPr lang="en-GB" dirty="0" smtClean="0"/>
-              <a:t>Demo – Out of Date Statistics</a:t>
+              <a:t>Statistics Histogram</a:t>
             </a:r>
             <a:endParaRPr lang="en-GB" dirty="0"/>
           </a:p>
         </p:txBody>
       </p:sp>
-      <p:sp>
-        <p:nvSpPr>
-          <p:cNvPr id="3" name="Content Placeholder 2"/>
-          <p:cNvSpPr>
-            <a:spLocks noGrp="1"/>
-          </p:cNvSpPr>
+      <p:graphicFrame>
+        <p:nvGraphicFramePr>
+          <p:cNvPr id="4" name="Content Placeholder 3"/>
+          <p:cNvGraphicFramePr>
+            <a:graphicFrameLocks noGrp="1"/>
+          </p:cNvGraphicFramePr>
           <p:nvPr>
             <p:ph idx="1"/>
-          </p:nvPr>
-        </p:nvSpPr>
-        <p:spPr/>
-        <p:txBody>
-          <a:bodyPr/>
-          <a:lstStyle/>
-          <a:p>
-            <a:endParaRPr lang="en-GB" dirty="0"/>
-          </a:p>
-        </p:txBody>
-      </p:sp>
+            <p:extLst>
+              <p:ext uri="{D42A27DB-BD31-4B8C-83A1-F6EECF244321}">
+                <p14:modId xmlns:p14="http://schemas.microsoft.com/office/powerpoint/2010/main" val="2035612574"/>
+              </p:ext>
+            </p:extLst>
+          </p:nvPr>
+        </p:nvGraphicFramePr>
+        <p:xfrm>
+          <a:off x="685800" y="1576388"/>
+          <a:ext cx="10131425" cy="4221162"/>
+        </p:xfrm>
+        <a:graphic>
+          <a:graphicData uri="http://schemas.openxmlformats.org/drawingml/2006/chart">
+            <c:chart xmlns:c="http://schemas.openxmlformats.org/drawingml/2006/chart" xmlns:r="http://schemas.openxmlformats.org/officeDocument/2006/relationships" r:id="rId3"/>
+          </a:graphicData>
+        </a:graphic>
+      </p:graphicFrame>
     </p:spTree>
     <p:extLst>
       <p:ext uri="{BB962C8B-B14F-4D97-AF65-F5344CB8AC3E}">
-        <p14:creationId xmlns:p14="http://schemas.microsoft.com/office/powerpoint/2010/main" val="1344992069"/>
+        <p14:creationId xmlns:p14="http://schemas.microsoft.com/office/powerpoint/2010/main" val="4145581422"/>
       </p:ext>
     </p:extLst>
   </p:cSld>
@@ -14595,7 +14678,7 @@
           <a:p>
             <a:r>
               <a:rPr lang="en-GB" dirty="0" smtClean="0"/>
-              <a:t>Statistics Again</a:t>
+              <a:t>Demo – Out of Date Statistics</a:t>
             </a:r>
             <a:endParaRPr lang="en-GB" dirty="0"/>
           </a:p>
@@ -14616,45 +14699,6 @@
           <a:bodyPr/>
           <a:lstStyle/>
           <a:p>
-            <a:r>
-              <a:rPr lang="en-GB" dirty="0" smtClean="0"/>
-              <a:t>The tipping point</a:t>
-            </a:r>
-          </a:p>
-          <a:p>
-            <a:pPr lvl="1"/>
-            <a:r>
-              <a:rPr lang="en-GB" dirty="0" smtClean="0"/>
-              <a:t>At some point SQL will estimate that it is quicker/more efficient to scan an table rather than seek on a index</a:t>
-            </a:r>
-          </a:p>
-          <a:p>
-            <a:pPr lvl="1"/>
-            <a:r>
-              <a:rPr lang="en-GB" dirty="0" smtClean="0"/>
-              <a:t>Usually around 30% of the pages in the table are being read</a:t>
-            </a:r>
-          </a:p>
-          <a:p>
-            <a:pPr lvl="2"/>
-            <a:r>
-              <a:rPr lang="en-GB" dirty="0" smtClean="0"/>
-              <a:t>Varies based on parallelism</a:t>
-            </a:r>
-          </a:p>
-          <a:p>
-            <a:pPr lvl="2"/>
-            <a:r>
-              <a:rPr lang="en-GB" dirty="0" smtClean="0"/>
-              <a:t>Or, memory pressure</a:t>
-            </a:r>
-          </a:p>
-          <a:p>
-            <a:pPr lvl="2"/>
-            <a:r>
-              <a:rPr lang="en-GB" dirty="0" smtClean="0"/>
-              <a:t>Never happens on a covering non clustered index</a:t>
-            </a:r>
             <a:endParaRPr lang="en-GB" dirty="0"/>
           </a:p>
         </p:txBody>
@@ -14662,7 +14706,7 @@
     </p:spTree>
     <p:extLst>
       <p:ext uri="{BB962C8B-B14F-4D97-AF65-F5344CB8AC3E}">
-        <p14:creationId xmlns:p14="http://schemas.microsoft.com/office/powerpoint/2010/main" val="1379164342"/>
+        <p14:creationId xmlns:p14="http://schemas.microsoft.com/office/powerpoint/2010/main" val="1344992069"/>
       </p:ext>
     </p:extLst>
   </p:cSld>
@@ -14713,7 +14757,7 @@
           <a:p>
             <a:r>
               <a:rPr lang="en-GB" dirty="0" smtClean="0"/>
-              <a:t>Indexes</a:t>
+              <a:t>Statistics Again</a:t>
             </a:r>
             <a:endParaRPr lang="en-GB" dirty="0"/>
           </a:p>
@@ -14736,46 +14780,43 @@
           <a:p>
             <a:r>
               <a:rPr lang="en-GB" dirty="0" smtClean="0"/>
-              <a:t>Query plans show the index used to find records in each table</a:t>
-            </a:r>
-          </a:p>
-          <a:p>
-            <a:r>
-              <a:rPr lang="en-GB" dirty="0" smtClean="0"/>
-              <a:t>They will be scanned or </a:t>
-            </a:r>
-            <a:r>
-              <a:rPr lang="en-GB" dirty="0" err="1" smtClean="0"/>
-              <a:t>seeked</a:t>
-            </a:r>
-            <a:endParaRPr lang="en-GB" dirty="0" smtClean="0"/>
-          </a:p>
-          <a:p>
-            <a:r>
-              <a:rPr lang="en-GB" dirty="0" smtClean="0"/>
-              <a:t>If a non clustered index does not include all the required columns a bookmark lookup is required</a:t>
+              <a:t>The tipping point</a:t>
             </a:r>
           </a:p>
           <a:p>
             <a:pPr lvl="1"/>
             <a:r>
               <a:rPr lang="en-GB" dirty="0" smtClean="0"/>
-              <a:t>This does not mean create indexes including every column!</a:t>
-            </a:r>
-          </a:p>
-          <a:p>
-            <a:r>
-              <a:rPr lang="en-GB" dirty="0" smtClean="0"/>
-              <a:t>Column order is important</a:t>
-            </a:r>
-          </a:p>
-          <a:p>
-            <a:r>
-              <a:rPr lang="en-GB" dirty="0" smtClean="0"/>
-              <a:t>Use filtered indexes on poor selecting columns (such as status)</a:t>
-            </a:r>
-          </a:p>
-          <a:p>
+              <a:t>At some point SQL will estimate that it is quicker/more efficient to scan an table rather than seek on a index</a:t>
+            </a:r>
+          </a:p>
+          <a:p>
+            <a:pPr lvl="1"/>
+            <a:r>
+              <a:rPr lang="en-GB" dirty="0" smtClean="0"/>
+              <a:t>Usually around 30% of the pages in the table are being read</a:t>
+            </a:r>
+          </a:p>
+          <a:p>
+            <a:pPr lvl="2"/>
+            <a:r>
+              <a:rPr lang="en-GB" dirty="0" smtClean="0"/>
+              <a:t>Varies based on parallelism</a:t>
+            </a:r>
+          </a:p>
+          <a:p>
+            <a:pPr lvl="2"/>
+            <a:r>
+              <a:rPr lang="en-GB" dirty="0" smtClean="0"/>
+              <a:t>Or, memory pressure</a:t>
+            </a:r>
+          </a:p>
+          <a:p>
+            <a:pPr lvl="2"/>
+            <a:r>
+              <a:rPr lang="en-GB" dirty="0" smtClean="0"/>
+              <a:t>Never happens on a covering non clustered index</a:t>
+            </a:r>
             <a:endParaRPr lang="en-GB" dirty="0"/>
           </a:p>
         </p:txBody>
@@ -14783,7 +14824,7 @@
     </p:spTree>
     <p:extLst>
       <p:ext uri="{BB962C8B-B14F-4D97-AF65-F5344CB8AC3E}">
-        <p14:creationId xmlns:p14="http://schemas.microsoft.com/office/powerpoint/2010/main" val="4160478381"/>
+        <p14:creationId xmlns:p14="http://schemas.microsoft.com/office/powerpoint/2010/main" val="1379164342"/>
       </p:ext>
     </p:extLst>
   </p:cSld>
@@ -14819,7 +14860,7 @@
       </p:grpSpPr>
       <p:sp>
         <p:nvSpPr>
-          <p:cNvPr id="4" name="Title 3"/>
+          <p:cNvPr id="2" name="Title 1"/>
           <p:cNvSpPr>
             <a:spLocks noGrp="1"/>
           </p:cNvSpPr>
@@ -14834,7 +14875,7 @@
           <a:p>
             <a:r>
               <a:rPr lang="en-GB" dirty="0" smtClean="0"/>
-              <a:t>Plan Reuse</a:t>
+              <a:t>Indexes</a:t>
             </a:r>
             <a:endParaRPr lang="en-GB" dirty="0"/>
           </a:p>
@@ -14842,12 +14883,12 @@
       </p:sp>
       <p:sp>
         <p:nvSpPr>
-          <p:cNvPr id="5" name="Text Placeholder 4"/>
+          <p:cNvPr id="3" name="Content Placeholder 2"/>
           <p:cNvSpPr>
             <a:spLocks noGrp="1"/>
           </p:cNvSpPr>
           <p:nvPr>
-            <p:ph type="body" idx="1"/>
+            <p:ph idx="1"/>
           </p:nvPr>
         </p:nvSpPr>
         <p:spPr/>
@@ -14855,14 +14896,56 @@
           <a:bodyPr/>
           <a:lstStyle/>
           <a:p>
-            <a:endParaRPr lang="en-GB"/>
+            <a:r>
+              <a:rPr lang="en-GB" dirty="0" smtClean="0"/>
+              <a:t>Query plans show the index used to find records in each table</a:t>
+            </a:r>
+          </a:p>
+          <a:p>
+            <a:r>
+              <a:rPr lang="en-GB" dirty="0" smtClean="0"/>
+              <a:t>They will be scanned or </a:t>
+            </a:r>
+            <a:r>
+              <a:rPr lang="en-GB" dirty="0" err="1" smtClean="0"/>
+              <a:t>seeked</a:t>
+            </a:r>
+            <a:endParaRPr lang="en-GB" dirty="0" smtClean="0"/>
+          </a:p>
+          <a:p>
+            <a:r>
+              <a:rPr lang="en-GB" dirty="0" smtClean="0"/>
+              <a:t>If a non clustered index does not include all the required columns a bookmark lookup is required</a:t>
+            </a:r>
+          </a:p>
+          <a:p>
+            <a:pPr lvl="1"/>
+            <a:r>
+              <a:rPr lang="en-GB" dirty="0" smtClean="0"/>
+              <a:t>This does not mean create indexes including every column!</a:t>
+            </a:r>
+          </a:p>
+          <a:p>
+            <a:r>
+              <a:rPr lang="en-GB" dirty="0" smtClean="0"/>
+              <a:t>Column order is important</a:t>
+            </a:r>
+          </a:p>
+          <a:p>
+            <a:r>
+              <a:rPr lang="en-GB" dirty="0" smtClean="0"/>
+              <a:t>Use filtered indexes on poor selecting columns (such as status)</a:t>
+            </a:r>
+          </a:p>
+          <a:p>
+            <a:endParaRPr lang="en-GB" dirty="0"/>
           </a:p>
         </p:txBody>
       </p:sp>
     </p:spTree>
     <p:extLst>
       <p:ext uri="{BB962C8B-B14F-4D97-AF65-F5344CB8AC3E}">
-        <p14:creationId xmlns:p14="http://schemas.microsoft.com/office/powerpoint/2010/main" val="2770975309"/>
+        <p14:creationId xmlns:p14="http://schemas.microsoft.com/office/powerpoint/2010/main" val="4160478381"/>
       </p:ext>
     </p:extLst>
   </p:cSld>
@@ -14898,7 +14981,7 @@
       </p:grpSpPr>
       <p:sp>
         <p:nvSpPr>
-          <p:cNvPr id="2" name="Title 1"/>
+          <p:cNvPr id="4" name="Title 3"/>
           <p:cNvSpPr>
             <a:spLocks noGrp="1"/>
           </p:cNvSpPr>
@@ -14913,7 +14996,7 @@
           <a:p>
             <a:r>
               <a:rPr lang="en-GB" dirty="0" smtClean="0"/>
-              <a:t>Why plan reuse</a:t>
+              <a:t>Plan Reuse</a:t>
             </a:r>
             <a:endParaRPr lang="en-GB" dirty="0"/>
           </a:p>
@@ -14921,71 +15004,33 @@
       </p:sp>
       <p:sp>
         <p:nvSpPr>
-          <p:cNvPr id="3" name="Content Placeholder 2"/>
+          <p:cNvPr id="5" name="Text Placeholder 4"/>
           <p:cNvSpPr>
             <a:spLocks noGrp="1"/>
           </p:cNvSpPr>
           <p:nvPr>
-            <p:ph idx="1"/>
-          </p:nvPr>
-        </p:nvSpPr>
-        <p:spPr>
-          <a:xfrm>
-            <a:off x="1981200" y="1500180"/>
-            <a:ext cx="8229600" cy="2214574"/>
-          </a:xfrm>
-        </p:spPr>
+            <p:ph type="body" idx="1"/>
+          </p:nvPr>
+        </p:nvSpPr>
+        <p:spPr/>
         <p:txBody>
-          <a:bodyPr>
-            <a:normAutofit/>
-          </a:bodyPr>
+          <a:bodyPr/>
           <a:lstStyle/>
           <a:p>
-            <a:r>
-              <a:rPr lang="en-GB" dirty="0" smtClean="0"/>
-              <a:t>Compilation can take longer than execution time</a:t>
-            </a:r>
-          </a:p>
-          <a:p>
-            <a:r>
-              <a:rPr lang="en-GB" dirty="0" smtClean="0"/>
-              <a:t>We want predictable results</a:t>
-            </a:r>
-          </a:p>
-          <a:p>
-            <a:r>
-              <a:rPr lang="en-GB" dirty="0" smtClean="0"/>
-              <a:t>Use our memory for data and not </a:t>
-            </a:r>
-            <a:r>
-              <a:rPr lang="en-GB" dirty="0" err="1" smtClean="0"/>
-              <a:t>adhoc</a:t>
-            </a:r>
-            <a:r>
-              <a:rPr lang="en-GB" dirty="0" smtClean="0"/>
-              <a:t> plans</a:t>
-            </a:r>
+            <a:endParaRPr lang="en-GB"/>
           </a:p>
         </p:txBody>
       </p:sp>
     </p:spTree>
     <p:extLst>
       <p:ext uri="{BB962C8B-B14F-4D97-AF65-F5344CB8AC3E}">
-        <p14:creationId xmlns:p14="http://schemas.microsoft.com/office/powerpoint/2010/main" val="3546211356"/>
+        <p14:creationId xmlns:p14="http://schemas.microsoft.com/office/powerpoint/2010/main" val="2770975309"/>
       </p:ext>
     </p:extLst>
   </p:cSld>
   <p:clrMapOvr>
     <a:masterClrMapping/>
   </p:clrMapOvr>
-  <mc:AlternateContent xmlns:mc="http://schemas.openxmlformats.org/markup-compatibility/2006" xmlns:p14="http://schemas.microsoft.com/office/powerpoint/2010/main">
-    <mc:Choice Requires="p14">
-      <p:transition spd="slow" p14:dur="2000"/>
-    </mc:Choice>
-    <mc:Fallback xmlns="">
-      <p:transition spd="slow"/>
-    </mc:Fallback>
-  </mc:AlternateContent>
   <p:timing>
     <p:tnLst>
       <p:par>
@@ -15030,36 +15075,65 @@
           <a:p>
             <a:r>
               <a:rPr lang="en-GB" dirty="0" smtClean="0"/>
-              <a:t>Plan reuse</a:t>
+              <a:t>Why plan reuse</a:t>
             </a:r>
             <a:endParaRPr lang="en-GB" dirty="0"/>
           </a:p>
         </p:txBody>
       </p:sp>
-      <p:graphicFrame>
-        <p:nvGraphicFramePr>
-          <p:cNvPr id="4" name="Content Placeholder 3"/>
-          <p:cNvGraphicFramePr>
-            <a:graphicFrameLocks noGrp="1"/>
-          </p:cNvGraphicFramePr>
+      <p:sp>
+        <p:nvSpPr>
+          <p:cNvPr id="3" name="Content Placeholder 2"/>
+          <p:cNvSpPr>
+            <a:spLocks noGrp="1"/>
+          </p:cNvSpPr>
           <p:nvPr>
             <p:ph idx="1"/>
           </p:nvPr>
-        </p:nvGraphicFramePr>
-        <p:xfrm>
-          <a:off x="1981200" y="1500189"/>
-          <a:ext cx="8229600" cy="4429125"/>
-        </p:xfrm>
-        <a:graphic>
-          <a:graphicData uri="http://schemas.openxmlformats.org/drawingml/2006/diagram">
-            <dgm:relIds xmlns:dgm="http://schemas.openxmlformats.org/drawingml/2006/diagram" xmlns:r="http://schemas.openxmlformats.org/officeDocument/2006/relationships" r:dm="rId3" r:lo="rId4" r:qs="rId5" r:cs="rId6"/>
-          </a:graphicData>
-        </a:graphic>
-      </p:graphicFrame>
+        </p:nvSpPr>
+        <p:spPr>
+          <a:xfrm>
+            <a:off x="1981200" y="1500180"/>
+            <a:ext cx="8229600" cy="2214574"/>
+          </a:xfrm>
+        </p:spPr>
+        <p:txBody>
+          <a:bodyPr>
+            <a:normAutofit/>
+          </a:bodyPr>
+          <a:lstStyle/>
+          <a:p>
+            <a:r>
+              <a:rPr lang="en-GB" dirty="0" smtClean="0"/>
+              <a:t>Compilation can take longer than execution time</a:t>
+            </a:r>
+          </a:p>
+          <a:p>
+            <a:r>
+              <a:rPr lang="en-GB" dirty="0" smtClean="0"/>
+              <a:t>We want predictable results</a:t>
+            </a:r>
+          </a:p>
+          <a:p>
+            <a:r>
+              <a:rPr lang="en-GB" dirty="0" smtClean="0"/>
+              <a:t>Use our memory for data and not </a:t>
+            </a:r>
+            <a:r>
+              <a:rPr lang="en-GB" dirty="0" err="1" smtClean="0"/>
+              <a:t>adhoc</a:t>
+            </a:r>
+            <a:r>
+              <a:rPr lang="en-GB" dirty="0" smtClean="0"/>
+              <a:t> plans</a:t>
+            </a:r>
+          </a:p>
+        </p:txBody>
+      </p:sp>
     </p:spTree>
     <p:extLst>
       <p:ext uri="{BB962C8B-B14F-4D97-AF65-F5344CB8AC3E}">
-        <p14:creationId xmlns:p14="http://schemas.microsoft.com/office/powerpoint/2010/main" val="1869684227"/>
+        <p14:creationId xmlns:p14="http://schemas.microsoft.com/office/powerpoint/2010/main" val="3546211356"/>
       </p:ext>
     </p:extLst>
   </p:cSld>
@@ -15118,122 +15192,50 @@
           <a:p>
             <a:r>
               <a:rPr lang="en-GB" dirty="0" smtClean="0"/>
-              <a:t>Parameterisation</a:t>
+              <a:t>Plan reuse</a:t>
             </a:r>
             <a:endParaRPr lang="en-GB" dirty="0"/>
           </a:p>
         </p:txBody>
       </p:sp>
-      <p:sp>
-        <p:nvSpPr>
-          <p:cNvPr id="3" name="Content Placeholder 2"/>
-          <p:cNvSpPr>
-            <a:spLocks noGrp="1"/>
-          </p:cNvSpPr>
+      <p:graphicFrame>
+        <p:nvGraphicFramePr>
+          <p:cNvPr id="4" name="Content Placeholder 3"/>
+          <p:cNvGraphicFramePr>
+            <a:graphicFrameLocks noGrp="1"/>
+          </p:cNvGraphicFramePr>
           <p:nvPr>
             <p:ph idx="1"/>
           </p:nvPr>
-        </p:nvSpPr>
-        <p:spPr>
-          <a:xfrm>
-            <a:off x="869595" y="1456726"/>
-            <a:ext cx="10515600" cy="4351338"/>
-          </a:xfrm>
-        </p:spPr>
-        <p:txBody>
-          <a:bodyPr>
-            <a:normAutofit lnSpcReduction="10000"/>
-          </a:bodyPr>
-          <a:lstStyle/>
-          <a:p>
-            <a:r>
-              <a:rPr lang="en-GB" dirty="0" smtClean="0"/>
-              <a:t>Query:</a:t>
-            </a:r>
-          </a:p>
-          <a:p>
-            <a:pPr lvl="1"/>
-            <a:r>
-              <a:rPr lang="en-GB" dirty="0" smtClean="0"/>
-              <a:t>SELECT * FROM Sales WHERE </a:t>
-            </a:r>
-            <a:r>
-              <a:rPr lang="en-GB" dirty="0" err="1" smtClean="0"/>
-              <a:t>SaleID</a:t>
-            </a:r>
-            <a:r>
-              <a:rPr lang="en-GB" dirty="0" smtClean="0"/>
-              <a:t> = 1001</a:t>
-            </a:r>
-          </a:p>
-          <a:p>
-            <a:r>
-              <a:rPr lang="en-GB" dirty="0" smtClean="0"/>
-              <a:t>Becomes:</a:t>
-            </a:r>
-            <a:endParaRPr lang="en-GB" dirty="0"/>
-          </a:p>
-          <a:p>
-            <a:pPr lvl="1"/>
-            <a:r>
-              <a:rPr lang="en-GB" dirty="0" smtClean="0"/>
-              <a:t>SELECT * FROM Sales WHERE </a:t>
-            </a:r>
-            <a:r>
-              <a:rPr lang="en-GB" dirty="0" err="1" smtClean="0"/>
-              <a:t>SaleID</a:t>
-            </a:r>
-            <a:r>
-              <a:rPr lang="en-GB" dirty="0" smtClean="0"/>
-              <a:t> = @p1</a:t>
-            </a:r>
-          </a:p>
-          <a:p>
-            <a:r>
-              <a:rPr lang="en-GB" dirty="0" smtClean="0"/>
-              <a:t>This increases the chance of a cache hit and reduces memory usage</a:t>
-            </a:r>
-          </a:p>
-          <a:p>
-            <a:r>
-              <a:rPr lang="en-GB" dirty="0" smtClean="0"/>
-              <a:t>Forced Parameterization </a:t>
-            </a:r>
-          </a:p>
-          <a:p>
-            <a:pPr lvl="1"/>
-            <a:r>
-              <a:rPr lang="en-GB" dirty="0" smtClean="0"/>
-              <a:t>Works on literal strings</a:t>
-            </a:r>
-          </a:p>
-          <a:p>
-            <a:pPr lvl="1"/>
-            <a:r>
-              <a:rPr lang="en-GB" dirty="0" smtClean="0"/>
-              <a:t>Will parameterize more queries</a:t>
-            </a:r>
-          </a:p>
-          <a:p>
-            <a:pPr lvl="1"/>
-            <a:r>
-              <a:rPr lang="en-GB" dirty="0" smtClean="0"/>
-              <a:t>But will increase chances of wrong plan</a:t>
-            </a:r>
-            <a:endParaRPr lang="en-GB" dirty="0"/>
-          </a:p>
-        </p:txBody>
-      </p:sp>
+        </p:nvGraphicFramePr>
+        <p:xfrm>
+          <a:off x="1981200" y="1500189"/>
+          <a:ext cx="8229600" cy="4429125"/>
+        </p:xfrm>
+        <a:graphic>
+          <a:graphicData uri="http://schemas.openxmlformats.org/drawingml/2006/diagram">
+            <dgm:relIds xmlns:dgm="http://schemas.openxmlformats.org/drawingml/2006/diagram" xmlns:r="http://schemas.openxmlformats.org/officeDocument/2006/relationships" r:dm="rId3" r:lo="rId4" r:qs="rId5" r:cs="rId6"/>
+          </a:graphicData>
+        </a:graphic>
+      </p:graphicFrame>
     </p:spTree>
     <p:extLst>
       <p:ext uri="{BB962C8B-B14F-4D97-AF65-F5344CB8AC3E}">
-        <p14:creationId xmlns:p14="http://schemas.microsoft.com/office/powerpoint/2010/main" val="1291243221"/>
+        <p14:creationId xmlns:p14="http://schemas.microsoft.com/office/powerpoint/2010/main" val="1869684227"/>
       </p:ext>
     </p:extLst>
   </p:cSld>
   <p:clrMapOvr>
     <a:masterClrMapping/>
   </p:clrMapOvr>
+  <mc:AlternateContent xmlns:mc="http://schemas.openxmlformats.org/markup-compatibility/2006" xmlns:p14="http://schemas.microsoft.com/office/powerpoint/2010/main">
+    <mc:Choice Requires="p14">
+      <p:transition spd="slow" p14:dur="2000"/>
+    </mc:Choice>
+    <mc:Fallback xmlns="">
+      <p:transition spd="slow"/>
+    </mc:Fallback>
+  </mc:AlternateContent>
   <p:timing>
     <p:tnLst>
       <p:par>
@@ -15278,7 +15280,7 @@
           <a:p>
             <a:r>
               <a:rPr lang="en-GB" dirty="0" smtClean="0"/>
-              <a:t>Todays Objectives</a:t>
+              <a:t>Welcome</a:t>
             </a:r>
             <a:endParaRPr lang="en-GB" dirty="0"/>
           </a:p>
@@ -15296,31 +15298,102 @@
         </p:nvSpPr>
         <p:spPr/>
         <p:txBody>
-          <a:bodyPr/>
+          <a:bodyPr>
+            <a:normAutofit/>
+          </a:bodyPr>
           <a:lstStyle/>
           <a:p>
             <a:r>
               <a:rPr lang="en-GB" dirty="0" smtClean="0"/>
-              <a:t>How SQL Server generates a query plan</a:t>
-            </a:r>
-          </a:p>
-          <a:p>
-            <a:r>
-              <a:rPr lang="en-GB" dirty="0" smtClean="0"/>
-              <a:t>When plans are and are not reused</a:t>
-            </a:r>
-          </a:p>
-          <a:p>
-            <a:r>
-              <a:rPr lang="en-GB" dirty="0" smtClean="0"/>
-              <a:t>How to read a query plan</a:t>
-            </a:r>
-          </a:p>
-          <a:p>
-            <a:r>
-              <a:rPr lang="en-GB" dirty="0" smtClean="0"/>
-              <a:t>Why query plans sometimes get it wrong</a:t>
-            </a:r>
+              <a:t>Get a VM:</a:t>
+            </a:r>
+          </a:p>
+          <a:p>
+            <a:pPr lvl="1"/>
+            <a:r>
+              <a:rPr lang="en-GB" dirty="0" smtClean="0"/>
+              <a:t>sabiniotr</a:t>
+            </a:r>
+            <a:r>
+              <a:rPr lang="en-GB" dirty="0" smtClean="0">
+                <a:solidFill>
+                  <a:srgbClr val="FF0000"/>
+                </a:solidFill>
+              </a:rPr>
+              <a:t>XX</a:t>
+            </a:r>
+            <a:r>
+              <a:rPr lang="en-GB" dirty="0" smtClean="0"/>
+              <a:t>.westeurope.cloudapp.azure.com</a:t>
+            </a:r>
+          </a:p>
+          <a:p>
+            <a:r>
+              <a:rPr lang="en-GB" dirty="0" smtClean="0"/>
+              <a:t>Login</a:t>
+            </a:r>
+          </a:p>
+          <a:p>
+            <a:pPr lvl="1"/>
+            <a:r>
+              <a:rPr lang="en-GB" dirty="0" smtClean="0"/>
+              <a:t>.\</a:t>
+            </a:r>
+            <a:r>
+              <a:rPr lang="en-GB" dirty="0" err="1" smtClean="0"/>
+              <a:t>SQLTraining</a:t>
+            </a:r>
+            <a:endParaRPr lang="en-GB" dirty="0" smtClean="0"/>
+          </a:p>
+          <a:p>
+            <a:pPr lvl="1"/>
+            <a:r>
+              <a:rPr lang="en-GB" dirty="0" smtClean="0"/>
+              <a:t>SQLTraining123</a:t>
+            </a:r>
+            <a:endParaRPr lang="en-GB" dirty="0" smtClean="0"/>
+          </a:p>
+          <a:p>
+            <a:r>
+              <a:rPr lang="en-GB" dirty="0" err="1" smtClean="0"/>
+              <a:t>Wifi</a:t>
+            </a:r>
+            <a:endParaRPr lang="en-GB" dirty="0" smtClean="0"/>
+          </a:p>
+          <a:p>
+            <a:pPr lvl="1"/>
+            <a:r>
+              <a:rPr lang="en-GB" dirty="0"/>
+              <a:t>U</a:t>
+            </a:r>
+            <a:r>
+              <a:rPr lang="en-GB" dirty="0" smtClean="0"/>
+              <a:t>sername</a:t>
+            </a:r>
+            <a:r>
+              <a:rPr lang="en-GB" dirty="0"/>
+              <a:t>:	huddle</a:t>
+            </a:r>
+          </a:p>
+          <a:p>
+            <a:pPr lvl="1"/>
+            <a:r>
+              <a:rPr lang="en-GB" dirty="0" smtClean="0"/>
+              <a:t>Password</a:t>
+            </a:r>
+            <a:r>
+              <a:rPr lang="en-GB" dirty="0"/>
+              <a:t>:	</a:t>
+            </a:r>
+            <a:r>
+              <a:rPr lang="en-GB" dirty="0" err="1"/>
+              <a:t>wCKEgk</a:t>
+            </a:r>
+            <a:endParaRPr lang="en-GB" dirty="0"/>
+          </a:p>
+          <a:p>
+            <a:pPr lvl="1"/>
+            <a:endParaRPr lang="en-GB" dirty="0" smtClean="0"/>
           </a:p>
         </p:txBody>
       </p:sp>
@@ -15378,6 +15451,166 @@
           <a:p>
             <a:r>
               <a:rPr lang="en-GB" dirty="0" smtClean="0"/>
+              <a:t>Parameterisation</a:t>
+            </a:r>
+            <a:endParaRPr lang="en-GB" dirty="0"/>
+          </a:p>
+        </p:txBody>
+      </p:sp>
+      <p:sp>
+        <p:nvSpPr>
+          <p:cNvPr id="3" name="Content Placeholder 2"/>
+          <p:cNvSpPr>
+            <a:spLocks noGrp="1"/>
+          </p:cNvSpPr>
+          <p:nvPr>
+            <p:ph idx="1"/>
+          </p:nvPr>
+        </p:nvSpPr>
+        <p:spPr>
+          <a:xfrm>
+            <a:off x="869595" y="1456726"/>
+            <a:ext cx="10515600" cy="4351338"/>
+          </a:xfrm>
+        </p:spPr>
+        <p:txBody>
+          <a:bodyPr>
+            <a:normAutofit lnSpcReduction="10000"/>
+          </a:bodyPr>
+          <a:lstStyle/>
+          <a:p>
+            <a:r>
+              <a:rPr lang="en-GB" dirty="0" smtClean="0"/>
+              <a:t>Query:</a:t>
+            </a:r>
+          </a:p>
+          <a:p>
+            <a:pPr lvl="1"/>
+            <a:r>
+              <a:rPr lang="en-GB" dirty="0" smtClean="0"/>
+              <a:t>SELECT * FROM Sales WHERE </a:t>
+            </a:r>
+            <a:r>
+              <a:rPr lang="en-GB" dirty="0" err="1" smtClean="0"/>
+              <a:t>SaleID</a:t>
+            </a:r>
+            <a:r>
+              <a:rPr lang="en-GB" dirty="0" smtClean="0"/>
+              <a:t> = 1001</a:t>
+            </a:r>
+          </a:p>
+          <a:p>
+            <a:r>
+              <a:rPr lang="en-GB" dirty="0" smtClean="0"/>
+              <a:t>Becomes:</a:t>
+            </a:r>
+            <a:endParaRPr lang="en-GB" dirty="0"/>
+          </a:p>
+          <a:p>
+            <a:pPr lvl="1"/>
+            <a:r>
+              <a:rPr lang="en-GB" dirty="0" smtClean="0"/>
+              <a:t>SELECT * FROM Sales WHERE </a:t>
+            </a:r>
+            <a:r>
+              <a:rPr lang="en-GB" dirty="0" err="1" smtClean="0"/>
+              <a:t>SaleID</a:t>
+            </a:r>
+            <a:r>
+              <a:rPr lang="en-GB" dirty="0" smtClean="0"/>
+              <a:t> = @p1</a:t>
+            </a:r>
+          </a:p>
+          <a:p>
+            <a:r>
+              <a:rPr lang="en-GB" dirty="0" smtClean="0"/>
+              <a:t>This increases the chance of a cache hit and reduces memory usage</a:t>
+            </a:r>
+          </a:p>
+          <a:p>
+            <a:r>
+              <a:rPr lang="en-GB" dirty="0" smtClean="0"/>
+              <a:t>Forced Parameterization </a:t>
+            </a:r>
+          </a:p>
+          <a:p>
+            <a:pPr lvl="1"/>
+            <a:r>
+              <a:rPr lang="en-GB" dirty="0" smtClean="0"/>
+              <a:t>Works on literal strings</a:t>
+            </a:r>
+          </a:p>
+          <a:p>
+            <a:pPr lvl="1"/>
+            <a:r>
+              <a:rPr lang="en-GB" dirty="0" smtClean="0"/>
+              <a:t>Will parameterize more queries</a:t>
+            </a:r>
+          </a:p>
+          <a:p>
+            <a:pPr lvl="1"/>
+            <a:r>
+              <a:rPr lang="en-GB" dirty="0" smtClean="0"/>
+              <a:t>But will increase chances of wrong plan</a:t>
+            </a:r>
+            <a:endParaRPr lang="en-GB" dirty="0"/>
+          </a:p>
+        </p:txBody>
+      </p:sp>
+    </p:spTree>
+    <p:extLst>
+      <p:ext uri="{BB962C8B-B14F-4D97-AF65-F5344CB8AC3E}">
+        <p14:creationId xmlns:p14="http://schemas.microsoft.com/office/powerpoint/2010/main" val="1291243221"/>
+      </p:ext>
+    </p:extLst>
+  </p:cSld>
+  <p:clrMapOvr>
+    <a:masterClrMapping/>
+  </p:clrMapOvr>
+  <p:timing>
+    <p:tnLst>
+      <p:par>
+        <p:cTn id="1" dur="indefinite" restart="never" nodeType="tmRoot"/>
+      </p:par>
+    </p:tnLst>
+  </p:timing>
+</p:sld>
+</file>
+
+<file path=ppt/slides/slide21.xml><?xml version="1.0" encoding="utf-8"?>
+<p:sld xmlns:a="http://schemas.openxmlformats.org/drawingml/2006/main" xmlns:r="http://schemas.openxmlformats.org/officeDocument/2006/relationships" xmlns:p="http://schemas.openxmlformats.org/presentationml/2006/main">
+  <p:cSld>
+    <p:spTree>
+      <p:nvGrpSpPr>
+        <p:cNvPr id="1" name=""/>
+        <p:cNvGrpSpPr/>
+        <p:nvPr/>
+      </p:nvGrpSpPr>
+      <p:grpSpPr>
+        <a:xfrm>
+          <a:off x="0" y="0"/>
+          <a:ext cx="0" cy="0"/>
+          <a:chOff x="0" y="0"/>
+          <a:chExt cx="0" cy="0"/>
+        </a:xfrm>
+      </p:grpSpPr>
+      <p:sp>
+        <p:nvSpPr>
+          <p:cNvPr id="2" name="Title 1"/>
+          <p:cNvSpPr>
+            <a:spLocks noGrp="1"/>
+          </p:cNvSpPr>
+          <p:nvPr>
+            <p:ph type="title"/>
+          </p:nvPr>
+        </p:nvSpPr>
+        <p:spPr/>
+        <p:txBody>
+          <a:bodyPr/>
+          <a:lstStyle/>
+          <a:p>
+            <a:r>
+              <a:rPr lang="en-GB" dirty="0" smtClean="0"/>
               <a:t>Parametrisation Example</a:t>
             </a:r>
             <a:endParaRPr lang="en-GB" dirty="0"/>
@@ -15525,99 +15758,6 @@
 </p:sld>
 </file>
 
-<file path=ppt/slides/slide21.xml><?xml version="1.0" encoding="utf-8"?>
-<p:sld xmlns:a="http://schemas.openxmlformats.org/drawingml/2006/main" xmlns:r="http://schemas.openxmlformats.org/officeDocument/2006/relationships" xmlns:p="http://schemas.openxmlformats.org/presentationml/2006/main">
-  <p:cSld>
-    <p:spTree>
-      <p:nvGrpSpPr>
-        <p:cNvPr id="1" name=""/>
-        <p:cNvGrpSpPr/>
-        <p:nvPr/>
-      </p:nvGrpSpPr>
-      <p:grpSpPr>
-        <a:xfrm>
-          <a:off x="0" y="0"/>
-          <a:ext cx="0" cy="0"/>
-          <a:chOff x="0" y="0"/>
-          <a:chExt cx="0" cy="0"/>
-        </a:xfrm>
-      </p:grpSpPr>
-      <p:sp>
-        <p:nvSpPr>
-          <p:cNvPr id="2" name="Title 1"/>
-          <p:cNvSpPr>
-            <a:spLocks noGrp="1"/>
-          </p:cNvSpPr>
-          <p:nvPr>
-            <p:ph type="title"/>
-          </p:nvPr>
-        </p:nvSpPr>
-        <p:spPr/>
-        <p:txBody>
-          <a:bodyPr/>
-          <a:lstStyle/>
-          <a:p>
-            <a:r>
-              <a:rPr lang="en-GB" dirty="0" smtClean="0"/>
-              <a:t>Demo – </a:t>
-            </a:r>
-            <a:r>
-              <a:rPr lang="en-GB" dirty="0"/>
-              <a:t>Parameterisation</a:t>
-            </a:r>
-            <a:endParaRPr lang="en-GB" dirty="0"/>
-          </a:p>
-        </p:txBody>
-      </p:sp>
-      <p:sp>
-        <p:nvSpPr>
-          <p:cNvPr id="3" name="Content Placeholder 2"/>
-          <p:cNvSpPr>
-            <a:spLocks noGrp="1"/>
-          </p:cNvSpPr>
-          <p:nvPr>
-            <p:ph idx="1"/>
-          </p:nvPr>
-        </p:nvSpPr>
-        <p:spPr/>
-        <p:txBody>
-          <a:bodyPr>
-            <a:normAutofit/>
-          </a:bodyPr>
-          <a:lstStyle/>
-          <a:p>
-            <a:endParaRPr lang="en-GB" dirty="0"/>
-          </a:p>
-        </p:txBody>
-      </p:sp>
-    </p:spTree>
-    <p:extLst>
-      <p:ext uri="{BB962C8B-B14F-4D97-AF65-F5344CB8AC3E}">
-        <p14:creationId xmlns:p14="http://schemas.microsoft.com/office/powerpoint/2010/main" val="849501960"/>
-      </p:ext>
-    </p:extLst>
-  </p:cSld>
-  <p:clrMapOvr>
-    <a:masterClrMapping/>
-  </p:clrMapOvr>
-  <mc:AlternateContent xmlns:mc="http://schemas.openxmlformats.org/markup-compatibility/2006" xmlns:p14="http://schemas.microsoft.com/office/powerpoint/2010/main">
-    <mc:Choice Requires="p14">
-      <p:transition spd="slow" p14:dur="2000"/>
-    </mc:Choice>
-    <mc:Fallback xmlns="">
-      <p:transition spd="slow"/>
-    </mc:Fallback>
-  </mc:AlternateContent>
-  <p:timing>
-    <p:tnLst>
-      <p:par>
-        <p:cTn id="1" dur="indefinite" restart="never" nodeType="tmRoot"/>
-      </p:par>
-    </p:tnLst>
-  </p:timing>
-</p:sld>
-</file>
-
 <file path=ppt/slides/slide22.xml><?xml version="1.0" encoding="utf-8"?>
 <p:sld xmlns:a="http://schemas.openxmlformats.org/drawingml/2006/main" xmlns:r="http://schemas.openxmlformats.org/officeDocument/2006/relationships" xmlns:p="http://schemas.openxmlformats.org/presentationml/2006/main">
   <p:cSld>
@@ -15652,9 +15792,12 @@
           <a:p>
             <a:r>
               <a:rPr lang="en-GB" dirty="0" smtClean="0"/>
-              <a:t>Bad plans</a:t>
-            </a:r>
-            <a:endParaRPr lang="en-GB" dirty="0"/>
+              <a:t>Demo – </a:t>
+            </a:r>
+            <a:r>
+              <a:rPr lang="en-GB" dirty="0"/>
+              <a:t>Parameterisation</a:t>
+            </a:r>
           </a:p>
         </p:txBody>
       </p:sp>
@@ -15671,65 +15814,10 @@
         <p:spPr/>
         <p:txBody>
           <a:bodyPr>
-            <a:normAutofit lnSpcReduction="10000"/>
+            <a:normAutofit/>
           </a:bodyPr>
           <a:lstStyle/>
           <a:p>
-            <a:r>
-              <a:rPr lang="en-GB" dirty="0" smtClean="0"/>
-              <a:t>Skewed data</a:t>
-            </a:r>
-          </a:p>
-          <a:p>
-            <a:r>
-              <a:rPr lang="en-GB" dirty="0" smtClean="0"/>
-              <a:t>Parameter value not sniffed</a:t>
-            </a:r>
-          </a:p>
-          <a:p>
-            <a:r>
-              <a:rPr lang="en-GB" dirty="0" smtClean="0"/>
-              <a:t>Look for </a:t>
-            </a:r>
-          </a:p>
-          <a:p>
-            <a:pPr lvl="1"/>
-            <a:r>
-              <a:rPr lang="en-GB" dirty="0" smtClean="0"/>
-              <a:t>Differing Actual v Estimate</a:t>
-            </a:r>
-          </a:p>
-          <a:p>
-            <a:pPr lvl="1"/>
-            <a:r>
-              <a:rPr lang="en-GB" dirty="0" smtClean="0"/>
-              <a:t>Loop joins </a:t>
-            </a:r>
-          </a:p>
-          <a:p>
-            <a:pPr lvl="1"/>
-            <a:r>
-              <a:rPr lang="en-GB" dirty="0" smtClean="0"/>
-              <a:t>Large reads/</a:t>
-            </a:r>
-            <a:r>
-              <a:rPr lang="en-GB" dirty="0" err="1" smtClean="0"/>
-              <a:t>cpu</a:t>
-            </a:r>
-            <a:endParaRPr lang="en-GB" dirty="0" smtClean="0"/>
-          </a:p>
-          <a:p>
-            <a:pPr lvl="1"/>
-            <a:r>
-              <a:rPr lang="en-GB" dirty="0" smtClean="0"/>
-              <a:t>Odd behaviour</a:t>
-            </a:r>
-          </a:p>
-          <a:p>
-            <a:r>
-              <a:rPr lang="en-GB" dirty="0" smtClean="0"/>
-              <a:t>Look in DMVs for plans, running code in SSMS may result in a new good plan</a:t>
-            </a:r>
             <a:endParaRPr lang="en-GB" dirty="0"/>
           </a:p>
         </p:txBody>
@@ -15737,7 +15825,7 @@
     </p:spTree>
     <p:extLst>
       <p:ext uri="{BB962C8B-B14F-4D97-AF65-F5344CB8AC3E}">
-        <p14:creationId xmlns:p14="http://schemas.microsoft.com/office/powerpoint/2010/main" val="1894684958"/>
+        <p14:creationId xmlns:p14="http://schemas.microsoft.com/office/powerpoint/2010/main" val="849501960"/>
       </p:ext>
     </p:extLst>
   </p:cSld>
@@ -15796,6 +15884,150 @@
           <a:p>
             <a:r>
               <a:rPr lang="en-GB" dirty="0" smtClean="0"/>
+              <a:t>Bad plans</a:t>
+            </a:r>
+            <a:endParaRPr lang="en-GB" dirty="0"/>
+          </a:p>
+        </p:txBody>
+      </p:sp>
+      <p:sp>
+        <p:nvSpPr>
+          <p:cNvPr id="3" name="Content Placeholder 2"/>
+          <p:cNvSpPr>
+            <a:spLocks noGrp="1"/>
+          </p:cNvSpPr>
+          <p:nvPr>
+            <p:ph idx="1"/>
+          </p:nvPr>
+        </p:nvSpPr>
+        <p:spPr/>
+        <p:txBody>
+          <a:bodyPr>
+            <a:normAutofit lnSpcReduction="10000"/>
+          </a:bodyPr>
+          <a:lstStyle/>
+          <a:p>
+            <a:r>
+              <a:rPr lang="en-GB" dirty="0" smtClean="0"/>
+              <a:t>Skewed data</a:t>
+            </a:r>
+          </a:p>
+          <a:p>
+            <a:r>
+              <a:rPr lang="en-GB" dirty="0" smtClean="0"/>
+              <a:t>Parameter value not sniffed</a:t>
+            </a:r>
+          </a:p>
+          <a:p>
+            <a:r>
+              <a:rPr lang="en-GB" dirty="0" smtClean="0"/>
+              <a:t>Look for </a:t>
+            </a:r>
+          </a:p>
+          <a:p>
+            <a:pPr lvl="1"/>
+            <a:r>
+              <a:rPr lang="en-GB" dirty="0" smtClean="0"/>
+              <a:t>Differing Actual v Estimate</a:t>
+            </a:r>
+          </a:p>
+          <a:p>
+            <a:pPr lvl="1"/>
+            <a:r>
+              <a:rPr lang="en-GB" dirty="0" smtClean="0"/>
+              <a:t>Loop joins </a:t>
+            </a:r>
+          </a:p>
+          <a:p>
+            <a:pPr lvl="1"/>
+            <a:r>
+              <a:rPr lang="en-GB" dirty="0" smtClean="0"/>
+              <a:t>Large reads/</a:t>
+            </a:r>
+            <a:r>
+              <a:rPr lang="en-GB" dirty="0" err="1" smtClean="0"/>
+              <a:t>cpu</a:t>
+            </a:r>
+            <a:endParaRPr lang="en-GB" dirty="0" smtClean="0"/>
+          </a:p>
+          <a:p>
+            <a:pPr lvl="1"/>
+            <a:r>
+              <a:rPr lang="en-GB" dirty="0" smtClean="0"/>
+              <a:t>Odd behaviour</a:t>
+            </a:r>
+          </a:p>
+          <a:p>
+            <a:r>
+              <a:rPr lang="en-GB" dirty="0" smtClean="0"/>
+              <a:t>Look in DMVs for plans, running code in SSMS may result in a new good plan</a:t>
+            </a:r>
+            <a:endParaRPr lang="en-GB" dirty="0"/>
+          </a:p>
+        </p:txBody>
+      </p:sp>
+    </p:spTree>
+    <p:extLst>
+      <p:ext uri="{BB962C8B-B14F-4D97-AF65-F5344CB8AC3E}">
+        <p14:creationId xmlns:p14="http://schemas.microsoft.com/office/powerpoint/2010/main" val="1894684958"/>
+      </p:ext>
+    </p:extLst>
+  </p:cSld>
+  <p:clrMapOvr>
+    <a:masterClrMapping/>
+  </p:clrMapOvr>
+  <mc:AlternateContent xmlns:mc="http://schemas.openxmlformats.org/markup-compatibility/2006" xmlns:p14="http://schemas.microsoft.com/office/powerpoint/2010/main">
+    <mc:Choice Requires="p14">
+      <p:transition spd="slow" p14:dur="2000"/>
+    </mc:Choice>
+    <mc:Fallback xmlns="">
+      <p:transition spd="slow"/>
+    </mc:Fallback>
+  </mc:AlternateContent>
+  <p:timing>
+    <p:tnLst>
+      <p:par>
+        <p:cTn id="1" dur="indefinite" restart="never" nodeType="tmRoot"/>
+      </p:par>
+    </p:tnLst>
+  </p:timing>
+</p:sld>
+</file>
+
+<file path=ppt/slides/slide24.xml><?xml version="1.0" encoding="utf-8"?>
+<p:sld xmlns:a="http://schemas.openxmlformats.org/drawingml/2006/main" xmlns:r="http://schemas.openxmlformats.org/officeDocument/2006/relationships" xmlns:p="http://schemas.openxmlformats.org/presentationml/2006/main">
+  <p:cSld>
+    <p:spTree>
+      <p:nvGrpSpPr>
+        <p:cNvPr id="1" name=""/>
+        <p:cNvGrpSpPr/>
+        <p:nvPr/>
+      </p:nvGrpSpPr>
+      <p:grpSpPr>
+        <a:xfrm>
+          <a:off x="0" y="0"/>
+          <a:ext cx="0" cy="0"/>
+          <a:chOff x="0" y="0"/>
+          <a:chExt cx="0" cy="0"/>
+        </a:xfrm>
+      </p:grpSpPr>
+      <p:sp>
+        <p:nvSpPr>
+          <p:cNvPr id="2" name="Title 1"/>
+          <p:cNvSpPr>
+            <a:spLocks noGrp="1"/>
+          </p:cNvSpPr>
+          <p:nvPr>
+            <p:ph type="title"/>
+          </p:nvPr>
+        </p:nvSpPr>
+        <p:spPr/>
+        <p:txBody>
+          <a:bodyPr/>
+          <a:lstStyle/>
+          <a:p>
+            <a:r>
+              <a:rPr lang="en-GB" dirty="0" smtClean="0"/>
               <a:t>Demo – Forced Parametrisation</a:t>
             </a:r>
             <a:endParaRPr lang="en-GB" dirty="0"/>
@@ -15822,7 +16054,7 @@
 </p:sld>
 </file>
 
-<file path=ppt/slides/slide24.xml><?xml version="1.0" encoding="utf-8"?>
+<file path=ppt/slides/slide25.xml><?xml version="1.0" encoding="utf-8"?>
 <p:sld xmlns:a="http://schemas.openxmlformats.org/drawingml/2006/main" xmlns:r="http://schemas.openxmlformats.org/officeDocument/2006/relationships" xmlns:p="http://schemas.openxmlformats.org/presentationml/2006/main">
   <p:cSld>
     <p:spTree>
@@ -15935,123 +16167,6 @@
 </p:sld>
 </file>
 
-<file path=ppt/slides/slide25.xml><?xml version="1.0" encoding="utf-8"?>
-<p:sld xmlns:a="http://schemas.openxmlformats.org/drawingml/2006/main" xmlns:r="http://schemas.openxmlformats.org/officeDocument/2006/relationships" xmlns:p="http://schemas.openxmlformats.org/presentationml/2006/main">
-  <p:cSld>
-    <p:spTree>
-      <p:nvGrpSpPr>
-        <p:cNvPr id="1" name=""/>
-        <p:cNvGrpSpPr/>
-        <p:nvPr/>
-      </p:nvGrpSpPr>
-      <p:grpSpPr>
-        <a:xfrm>
-          <a:off x="0" y="0"/>
-          <a:ext cx="0" cy="0"/>
-          <a:chOff x="0" y="0"/>
-          <a:chExt cx="0" cy="0"/>
-        </a:xfrm>
-      </p:grpSpPr>
-      <p:sp>
-        <p:nvSpPr>
-          <p:cNvPr id="2" name="Title 1"/>
-          <p:cNvSpPr>
-            <a:spLocks noGrp="1"/>
-          </p:cNvSpPr>
-          <p:nvPr>
-            <p:ph type="title"/>
-          </p:nvPr>
-        </p:nvSpPr>
-        <p:spPr/>
-        <p:txBody>
-          <a:bodyPr/>
-          <a:lstStyle/>
-          <a:p>
-            <a:r>
-              <a:rPr lang="en-GB" dirty="0" smtClean="0"/>
-              <a:t>ORMs</a:t>
-            </a:r>
-            <a:endParaRPr lang="en-GB" dirty="0"/>
-          </a:p>
-        </p:txBody>
-      </p:sp>
-      <p:sp>
-        <p:nvSpPr>
-          <p:cNvPr id="3" name="Content Placeholder 2"/>
-          <p:cNvSpPr>
-            <a:spLocks noGrp="1"/>
-          </p:cNvSpPr>
-          <p:nvPr>
-            <p:ph idx="1"/>
-          </p:nvPr>
-        </p:nvSpPr>
-        <p:spPr/>
-        <p:txBody>
-          <a:bodyPr/>
-          <a:lstStyle/>
-          <a:p>
-            <a:r>
-              <a:rPr lang="en-GB" dirty="0" err="1" smtClean="0"/>
-              <a:t>nHiberbate</a:t>
-            </a:r>
-            <a:r>
-              <a:rPr lang="en-GB" dirty="0" smtClean="0"/>
-              <a:t>/</a:t>
-            </a:r>
-            <a:r>
-              <a:rPr lang="en-GB" dirty="0" err="1" smtClean="0"/>
-              <a:t>Linq</a:t>
-            </a:r>
-            <a:endParaRPr lang="en-GB" dirty="0" smtClean="0"/>
-          </a:p>
-          <a:p>
-            <a:r>
-              <a:rPr lang="en-GB" dirty="0" err="1" smtClean="0"/>
-              <a:t>Adhoc</a:t>
-            </a:r>
-            <a:r>
-              <a:rPr lang="en-GB" dirty="0" smtClean="0"/>
-              <a:t> Plan Caching</a:t>
-            </a:r>
-          </a:p>
-          <a:p>
-            <a:pPr lvl="1"/>
-            <a:r>
-              <a:rPr lang="en-GB" dirty="0" smtClean="0"/>
-              <a:t>Server setting to cache on 2</a:t>
-            </a:r>
-            <a:r>
-              <a:rPr lang="en-GB" baseline="30000" dirty="0" smtClean="0"/>
-              <a:t>nd</a:t>
-            </a:r>
-            <a:r>
-              <a:rPr lang="en-GB" dirty="0" smtClean="0"/>
-              <a:t> execution only to save memory</a:t>
-            </a:r>
-            <a:endParaRPr lang="en-GB" dirty="0"/>
-          </a:p>
-        </p:txBody>
-      </p:sp>
-    </p:spTree>
-    <p:extLst>
-      <p:ext uri="{BB962C8B-B14F-4D97-AF65-F5344CB8AC3E}">
-        <p14:creationId xmlns:p14="http://schemas.microsoft.com/office/powerpoint/2010/main" val="750773888"/>
-      </p:ext>
-    </p:extLst>
-  </p:cSld>
-  <p:clrMapOvr>
-    <a:masterClrMapping/>
-  </p:clrMapOvr>
-  <p:timing>
-    <p:tnLst>
-      <p:par>
-        <p:cTn id="1" dur="indefinite" restart="never" nodeType="tmRoot"/>
-      </p:par>
-    </p:tnLst>
-  </p:timing>
-</p:sld>
-</file>
-
 <file path=ppt/slides/slide26.xml><?xml version="1.0" encoding="utf-8"?>
 <p:sld xmlns:a="http://schemas.openxmlformats.org/drawingml/2006/main" xmlns:r="http://schemas.openxmlformats.org/officeDocument/2006/relationships" xmlns:p="http://schemas.openxmlformats.org/presentationml/2006/main">
   <p:cSld>
@@ -16086,7 +16201,7 @@
           <a:p>
             <a:r>
               <a:rPr lang="en-GB" dirty="0" smtClean="0"/>
-              <a:t>When do plans change?</a:t>
+              <a:t>ORMs</a:t>
             </a:r>
             <a:endParaRPr lang="en-GB" dirty="0"/>
           </a:p>
@@ -16108,32 +16223,42 @@
           <a:lstStyle/>
           <a:p>
             <a:r>
-              <a:rPr lang="en-GB" dirty="0" smtClean="0"/>
-              <a:t>Statistics Change</a:t>
-            </a:r>
-          </a:p>
-          <a:p>
-            <a:r>
-              <a:rPr lang="en-GB" dirty="0" smtClean="0"/>
-              <a:t>Different SET options – Next demo</a:t>
-            </a:r>
-          </a:p>
-          <a:p>
-            <a:r>
-              <a:rPr lang="en-GB" dirty="0" smtClean="0"/>
-              <a:t>Object Changed</a:t>
-            </a:r>
-          </a:p>
-          <a:p>
-            <a:r>
-              <a:rPr lang="en-GB" dirty="0" smtClean="0"/>
-              <a:t>Forced Recompile</a:t>
-            </a:r>
-          </a:p>
-          <a:p>
-            <a:r>
-              <a:rPr lang="en-GB" dirty="0" smtClean="0"/>
-              <a:t>Server restart will clear plan cache</a:t>
+              <a:rPr lang="en-GB" dirty="0" err="1" smtClean="0"/>
+              <a:t>nHiberbate</a:t>
+            </a:r>
+            <a:r>
+              <a:rPr lang="en-GB" dirty="0" smtClean="0"/>
+              <a:t>/</a:t>
+            </a:r>
+            <a:r>
+              <a:rPr lang="en-GB" dirty="0" err="1" smtClean="0"/>
+              <a:t>Linq</a:t>
+            </a:r>
+            <a:endParaRPr lang="en-GB" dirty="0" smtClean="0"/>
+          </a:p>
+          <a:p>
+            <a:r>
+              <a:rPr lang="en-GB" dirty="0" err="1" smtClean="0"/>
+              <a:t>Adhoc</a:t>
+            </a:r>
+            <a:r>
+              <a:rPr lang="en-GB" dirty="0" smtClean="0"/>
+              <a:t> Plan Caching</a:t>
+            </a:r>
+          </a:p>
+          <a:p>
+            <a:pPr lvl="1"/>
+            <a:r>
+              <a:rPr lang="en-GB" dirty="0" smtClean="0"/>
+              <a:t>Server setting to cache on 2</a:t>
+            </a:r>
+            <a:r>
+              <a:rPr lang="en-GB" baseline="30000" dirty="0" smtClean="0"/>
+              <a:t>nd</a:t>
+            </a:r>
+            <a:r>
+              <a:rPr lang="en-GB" dirty="0" smtClean="0"/>
+              <a:t> execution only to save memory</a:t>
             </a:r>
             <a:endParaRPr lang="en-GB" dirty="0"/>
           </a:p>
@@ -16142,7 +16267,7 @@
     </p:spTree>
     <p:extLst>
       <p:ext uri="{BB962C8B-B14F-4D97-AF65-F5344CB8AC3E}">
-        <p14:creationId xmlns:p14="http://schemas.microsoft.com/office/powerpoint/2010/main" val="2474612064"/>
+        <p14:creationId xmlns:p14="http://schemas.microsoft.com/office/powerpoint/2010/main" val="750773888"/>
       </p:ext>
     </p:extLst>
   </p:cSld>
@@ -16193,6 +16318,118 @@
           <a:p>
             <a:r>
               <a:rPr lang="en-GB" dirty="0" smtClean="0"/>
+              <a:t>When do plans change?</a:t>
+            </a:r>
+            <a:endParaRPr lang="en-GB" dirty="0"/>
+          </a:p>
+        </p:txBody>
+      </p:sp>
+      <p:sp>
+        <p:nvSpPr>
+          <p:cNvPr id="3" name="Content Placeholder 2"/>
+          <p:cNvSpPr>
+            <a:spLocks noGrp="1"/>
+          </p:cNvSpPr>
+          <p:nvPr>
+            <p:ph idx="1"/>
+          </p:nvPr>
+        </p:nvSpPr>
+        <p:spPr/>
+        <p:txBody>
+          <a:bodyPr/>
+          <a:lstStyle/>
+          <a:p>
+            <a:r>
+              <a:rPr lang="en-GB" dirty="0" smtClean="0"/>
+              <a:t>Statistics Change</a:t>
+            </a:r>
+          </a:p>
+          <a:p>
+            <a:r>
+              <a:rPr lang="en-GB" dirty="0" smtClean="0"/>
+              <a:t>Different SET options </a:t>
+            </a:r>
+            <a:r>
+              <a:rPr lang="en-GB" dirty="0" smtClean="0"/>
+              <a:t>– demo later</a:t>
+            </a:r>
+            <a:endParaRPr lang="en-GB" dirty="0" smtClean="0"/>
+          </a:p>
+          <a:p>
+            <a:r>
+              <a:rPr lang="en-GB" dirty="0" smtClean="0"/>
+              <a:t>Object Changed</a:t>
+            </a:r>
+          </a:p>
+          <a:p>
+            <a:r>
+              <a:rPr lang="en-GB" dirty="0" smtClean="0"/>
+              <a:t>Forced Recompile</a:t>
+            </a:r>
+          </a:p>
+          <a:p>
+            <a:r>
+              <a:rPr lang="en-GB" dirty="0" smtClean="0"/>
+              <a:t>Server restart will clear plan cache</a:t>
+            </a:r>
+            <a:endParaRPr lang="en-GB" dirty="0"/>
+          </a:p>
+        </p:txBody>
+      </p:sp>
+    </p:spTree>
+    <p:extLst>
+      <p:ext uri="{BB962C8B-B14F-4D97-AF65-F5344CB8AC3E}">
+        <p14:creationId xmlns:p14="http://schemas.microsoft.com/office/powerpoint/2010/main" val="2474612064"/>
+      </p:ext>
+    </p:extLst>
+  </p:cSld>
+  <p:clrMapOvr>
+    <a:masterClrMapping/>
+  </p:clrMapOvr>
+  <p:timing>
+    <p:tnLst>
+      <p:par>
+        <p:cTn id="1" dur="indefinite" restart="never" nodeType="tmRoot"/>
+      </p:par>
+    </p:tnLst>
+  </p:timing>
+</p:sld>
+</file>
+
+<file path=ppt/slides/slide28.xml><?xml version="1.0" encoding="utf-8"?>
+<p:sld xmlns:a="http://schemas.openxmlformats.org/drawingml/2006/main" xmlns:r="http://schemas.openxmlformats.org/officeDocument/2006/relationships" xmlns:p="http://schemas.openxmlformats.org/presentationml/2006/main">
+  <p:cSld>
+    <p:spTree>
+      <p:nvGrpSpPr>
+        <p:cNvPr id="1" name=""/>
+        <p:cNvGrpSpPr/>
+        <p:nvPr/>
+      </p:nvGrpSpPr>
+      <p:grpSpPr>
+        <a:xfrm>
+          <a:off x="0" y="0"/>
+          <a:ext cx="0" cy="0"/>
+          <a:chOff x="0" y="0"/>
+          <a:chExt cx="0" cy="0"/>
+        </a:xfrm>
+      </p:grpSpPr>
+      <p:sp>
+        <p:nvSpPr>
+          <p:cNvPr id="2" name="Title 1"/>
+          <p:cNvSpPr>
+            <a:spLocks noGrp="1"/>
+          </p:cNvSpPr>
+          <p:nvPr>
+            <p:ph type="title"/>
+          </p:nvPr>
+        </p:nvSpPr>
+        <p:spPr/>
+        <p:txBody>
+          <a:bodyPr/>
+          <a:lstStyle/>
+          <a:p>
+            <a:r>
+              <a:rPr lang="en-GB" dirty="0" smtClean="0"/>
               <a:t>Demo – </a:t>
             </a:r>
             <a:r>
@@ -16256,7 +16493,7 @@
 </p:sld>
 </file>
 
-<file path=ppt/slides/slide28.xml><?xml version="1.0" encoding="utf-8"?>
+<file path=ppt/slides/slide29.xml><?xml version="1.0" encoding="utf-8"?>
 <p:sld xmlns:a="http://schemas.openxmlformats.org/drawingml/2006/main" xmlns:r="http://schemas.openxmlformats.org/officeDocument/2006/relationships" xmlns:p="http://schemas.openxmlformats.org/presentationml/2006/main">
   <p:cSld>
     <p:spTree>
@@ -16480,147 +16717,6 @@
 </p:sld>
 </file>
 
-<file path=ppt/slides/slide29.xml><?xml version="1.0" encoding="utf-8"?>
-<p:sld xmlns:a="http://schemas.openxmlformats.org/drawingml/2006/main" xmlns:r="http://schemas.openxmlformats.org/officeDocument/2006/relationships" xmlns:p="http://schemas.openxmlformats.org/presentationml/2006/main">
-  <p:cSld>
-    <p:spTree>
-      <p:nvGrpSpPr>
-        <p:cNvPr id="1" name=""/>
-        <p:cNvGrpSpPr/>
-        <p:nvPr/>
-      </p:nvGrpSpPr>
-      <p:grpSpPr>
-        <a:xfrm>
-          <a:off x="0" y="0"/>
-          <a:ext cx="0" cy="0"/>
-          <a:chOff x="0" y="0"/>
-          <a:chExt cx="0" cy="0"/>
-        </a:xfrm>
-      </p:grpSpPr>
-      <p:sp>
-        <p:nvSpPr>
-          <p:cNvPr id="2" name="Title 1"/>
-          <p:cNvSpPr>
-            <a:spLocks noGrp="1"/>
-          </p:cNvSpPr>
-          <p:nvPr>
-            <p:ph type="title"/>
-          </p:nvPr>
-        </p:nvSpPr>
-        <p:spPr/>
-        <p:txBody>
-          <a:bodyPr/>
-          <a:lstStyle/>
-          <a:p>
-            <a:r>
-              <a:rPr lang="en-GB" dirty="0"/>
-              <a:t>P</a:t>
-            </a:r>
-            <a:r>
-              <a:rPr lang="en-GB" dirty="0" smtClean="0"/>
-              <a:t>arallelism</a:t>
-            </a:r>
-            <a:endParaRPr lang="en-GB" dirty="0"/>
-          </a:p>
-        </p:txBody>
-      </p:sp>
-      <p:sp>
-        <p:nvSpPr>
-          <p:cNvPr id="3" name="Content Placeholder 2"/>
-          <p:cNvSpPr>
-            <a:spLocks noGrp="1"/>
-          </p:cNvSpPr>
-          <p:nvPr>
-            <p:ph idx="1"/>
-          </p:nvPr>
-        </p:nvSpPr>
-        <p:spPr/>
-        <p:txBody>
-          <a:bodyPr>
-            <a:normAutofit lnSpcReduction="10000"/>
-          </a:bodyPr>
-          <a:lstStyle/>
-          <a:p>
-            <a:r>
-              <a:rPr lang="en-GB" dirty="0" smtClean="0"/>
-              <a:t>The use of multiple </a:t>
-            </a:r>
-            <a:r>
-              <a:rPr lang="en-GB" dirty="0" err="1" smtClean="0"/>
-              <a:t>cpus</a:t>
-            </a:r>
-            <a:r>
-              <a:rPr lang="en-GB" dirty="0" smtClean="0"/>
-              <a:t>/cores</a:t>
-            </a:r>
-          </a:p>
-          <a:p>
-            <a:r>
-              <a:rPr lang="en-GB" dirty="0" smtClean="0"/>
-              <a:t>Controlled by server level configuration</a:t>
-            </a:r>
-          </a:p>
-          <a:p>
-            <a:pPr lvl="1"/>
-            <a:r>
-              <a:rPr lang="en-GB" dirty="0" smtClean="0"/>
-              <a:t>Overwritten by query hint (MAXDOP)</a:t>
-            </a:r>
-          </a:p>
-          <a:p>
-            <a:r>
-              <a:rPr lang="en-GB" dirty="0" smtClean="0"/>
-              <a:t>Not always possible	</a:t>
-            </a:r>
-          </a:p>
-          <a:p>
-            <a:pPr lvl="1"/>
-            <a:r>
-              <a:rPr lang="en-GB" dirty="0" smtClean="0"/>
-              <a:t>Distinct Count</a:t>
-            </a:r>
-          </a:p>
-          <a:p>
-            <a:r>
-              <a:rPr lang="en-GB" dirty="0" smtClean="0"/>
-              <a:t>Not always wanted</a:t>
-            </a:r>
-          </a:p>
-          <a:p>
-            <a:r>
-              <a:rPr lang="en-GB" dirty="0" smtClean="0"/>
-              <a:t>Skewed statistics leads to uneven threads (CXPACKET)</a:t>
-            </a:r>
-          </a:p>
-          <a:p>
-            <a:r>
-              <a:rPr lang="en-GB" dirty="0" smtClean="0"/>
-              <a:t>Cost Threshold dictates if it should be considered (Server level setting)</a:t>
-            </a:r>
-            <a:endParaRPr lang="en-GB" dirty="0"/>
-          </a:p>
-        </p:txBody>
-      </p:sp>
-    </p:spTree>
-    <p:extLst>
-      <p:ext uri="{BB962C8B-B14F-4D97-AF65-F5344CB8AC3E}">
-        <p14:creationId xmlns:p14="http://schemas.microsoft.com/office/powerpoint/2010/main" val="2989566329"/>
-      </p:ext>
-    </p:extLst>
-  </p:cSld>
-  <p:clrMapOvr>
-    <a:masterClrMapping/>
-  </p:clrMapOvr>
-  <p:timing>
-    <p:tnLst>
-      <p:par>
-        <p:cTn id="1" dur="indefinite" restart="never" nodeType="tmRoot"/>
-      </p:par>
-    </p:tnLst>
-  </p:timing>
-</p:sld>
-</file>
-
 <file path=ppt/slides/slide3.xml><?xml version="1.0" encoding="utf-8"?>
 <p:sld xmlns:a="http://schemas.openxmlformats.org/drawingml/2006/main" xmlns:r="http://schemas.openxmlformats.org/officeDocument/2006/relationships" xmlns:p="http://schemas.openxmlformats.org/presentationml/2006/main">
   <p:cSld>
@@ -16640,7 +16736,7 @@
       </p:grpSpPr>
       <p:sp>
         <p:nvSpPr>
-          <p:cNvPr id="4" name="Title 3"/>
+          <p:cNvPr id="2" name="Title 1"/>
           <p:cNvSpPr>
             <a:spLocks noGrp="1"/>
           </p:cNvSpPr>
@@ -16655,7 +16751,7 @@
           <a:p>
             <a:r>
               <a:rPr lang="en-GB" dirty="0" smtClean="0"/>
-              <a:t>Query Plans</a:t>
+              <a:t>Todays Objectives</a:t>
             </a:r>
             <a:endParaRPr lang="en-GB" dirty="0"/>
           </a:p>
@@ -16663,12 +16759,12 @@
       </p:sp>
       <p:sp>
         <p:nvSpPr>
-          <p:cNvPr id="5" name="Text Placeholder 4"/>
+          <p:cNvPr id="3" name="Content Placeholder 2"/>
           <p:cNvSpPr>
             <a:spLocks noGrp="1"/>
           </p:cNvSpPr>
           <p:nvPr>
-            <p:ph type="body" idx="1"/>
+            <p:ph idx="1"/>
           </p:nvPr>
         </p:nvSpPr>
         <p:spPr/>
@@ -16676,14 +16772,35 @@
           <a:bodyPr/>
           <a:lstStyle/>
           <a:p>
-            <a:endParaRPr lang="en-GB"/>
+            <a:r>
+              <a:rPr lang="en-GB" dirty="0" smtClean="0"/>
+              <a:t>How SQL Server generates a query plan</a:t>
+            </a:r>
+          </a:p>
+          <a:p>
+            <a:r>
+              <a:rPr lang="en-GB" dirty="0" smtClean="0"/>
+              <a:t>When plans are and are not reused</a:t>
+            </a:r>
+          </a:p>
+          <a:p>
+            <a:r>
+              <a:rPr lang="en-GB" dirty="0" smtClean="0"/>
+              <a:t>How to read a query plan</a:t>
+            </a:r>
+          </a:p>
+          <a:p>
+            <a:r>
+              <a:rPr lang="en-GB" dirty="0" smtClean="0"/>
+              <a:t>Why query plans sometimes get it wrong</a:t>
+            </a:r>
           </a:p>
         </p:txBody>
       </p:sp>
     </p:spTree>
     <p:extLst>
       <p:ext uri="{BB962C8B-B14F-4D97-AF65-F5344CB8AC3E}">
-        <p14:creationId xmlns:p14="http://schemas.microsoft.com/office/powerpoint/2010/main" val="3916409609"/>
+        <p14:creationId xmlns:p14="http://schemas.microsoft.com/office/powerpoint/2010/main" val="1010077829"/>
       </p:ext>
     </p:extLst>
   </p:cSld>
@@ -16733,8 +16850,12 @@
           <a:lstStyle/>
           <a:p>
             <a:r>
-              <a:rPr lang="en-GB" dirty="0" smtClean="0"/>
-              <a:t>Memory Grants &amp; Spills</a:t>
+              <a:rPr lang="en-GB" dirty="0"/>
+              <a:t>P</a:t>
+            </a:r>
+            <a:r>
+              <a:rPr lang="en-GB" dirty="0" smtClean="0"/>
+              <a:t>arallelism</a:t>
             </a:r>
             <a:endParaRPr lang="en-GB" dirty="0"/>
           </a:p>
@@ -16759,71 +16880,60 @@
           <a:p>
             <a:r>
               <a:rPr lang="en-GB" dirty="0" smtClean="0"/>
-              <a:t>Working memory space required to complete query</a:t>
-            </a:r>
-          </a:p>
-          <a:p>
-            <a:r>
-              <a:rPr lang="en-GB" dirty="0" smtClean="0"/>
-              <a:t>Lack of memory causes RESOURCE_SEMAPHORE waits</a:t>
-            </a:r>
-          </a:p>
-          <a:p>
-            <a:r>
-              <a:rPr lang="en-GB" dirty="0" smtClean="0"/>
-              <a:t>Memory grant is estimated</a:t>
+              <a:t>The use of multiple </a:t>
+            </a:r>
+            <a:r>
+              <a:rPr lang="en-GB" dirty="0" err="1" smtClean="0"/>
+              <a:t>cpus</a:t>
+            </a:r>
+            <a:r>
+              <a:rPr lang="en-GB" dirty="0" smtClean="0"/>
+              <a:t>/cores</a:t>
+            </a:r>
+          </a:p>
+          <a:p>
+            <a:r>
+              <a:rPr lang="en-GB" dirty="0" smtClean="0"/>
+              <a:t>Controlled by server level configuration</a:t>
             </a:r>
           </a:p>
           <a:p>
             <a:pPr lvl="1"/>
             <a:r>
               <a:rPr lang="en-GB" dirty="0" smtClean="0"/>
-              <a:t>Based on estimated rows expected from each operator</a:t>
+              <a:t>Overwritten by query hint (MAXDOP)</a:t>
+            </a:r>
+          </a:p>
+          <a:p>
+            <a:r>
+              <a:rPr lang="en-GB" dirty="0" smtClean="0"/>
+              <a:t>Not always possible	</a:t>
             </a:r>
           </a:p>
           <a:p>
             <a:pPr lvl="1"/>
             <a:r>
               <a:rPr lang="en-GB" dirty="0" smtClean="0"/>
-              <a:t>Estimated space required to perform joins and aggregations</a:t>
-            </a:r>
-          </a:p>
-          <a:p>
-            <a:r>
-              <a:rPr lang="en-GB" dirty="0" smtClean="0"/>
-              <a:t>If under estimated the query will “spill” to </a:t>
-            </a:r>
-            <a:r>
-              <a:rPr lang="en-GB" dirty="0" err="1" smtClean="0"/>
-              <a:t>tempDB</a:t>
-            </a:r>
-            <a:endParaRPr lang="en-GB" dirty="0" smtClean="0"/>
-          </a:p>
-          <a:p>
-            <a:pPr lvl="1"/>
-            <a:r>
-              <a:rPr lang="en-GB" dirty="0" smtClean="0"/>
-              <a:t>This is very bad</a:t>
-            </a:r>
-          </a:p>
-          <a:p>
-            <a:r>
-              <a:rPr lang="en-GB" dirty="0" smtClean="0"/>
-              <a:t>If heavily over estimated the server may run out of memory</a:t>
-            </a:r>
-          </a:p>
-          <a:p>
-            <a:pPr lvl="1"/>
-            <a:endParaRPr lang="en-GB" dirty="0" smtClean="0"/>
-          </a:p>
-          <a:p>
-            <a:endParaRPr lang="en-GB" dirty="0" smtClean="0"/>
-          </a:p>
-          <a:p>
-            <a:endParaRPr lang="en-GB" dirty="0" smtClean="0"/>
-          </a:p>
-          <a:p>
-            <a:pPr lvl="1"/>
+              <a:t>Distinct Count</a:t>
+            </a:r>
+          </a:p>
+          <a:p>
+            <a:r>
+              <a:rPr lang="en-GB" dirty="0" smtClean="0"/>
+              <a:t>Not always wanted</a:t>
+            </a:r>
+          </a:p>
+          <a:p>
+            <a:r>
+              <a:rPr lang="en-GB" dirty="0" smtClean="0"/>
+              <a:t>Skewed statistics leads to uneven threads (CXPACKET)</a:t>
+            </a:r>
+          </a:p>
+          <a:p>
+            <a:r>
+              <a:rPr lang="en-GB" dirty="0" smtClean="0"/>
+              <a:t>Cost Threshold dictates if it should be considered (Server level setting)</a:t>
+            </a:r>
             <a:endParaRPr lang="en-GB" dirty="0"/>
           </a:p>
         </p:txBody>
@@ -16831,7 +16941,7 @@
     </p:spTree>
     <p:extLst>
       <p:ext uri="{BB962C8B-B14F-4D97-AF65-F5344CB8AC3E}">
-        <p14:creationId xmlns:p14="http://schemas.microsoft.com/office/powerpoint/2010/main" val="4114035203"/>
+        <p14:creationId xmlns:p14="http://schemas.microsoft.com/office/powerpoint/2010/main" val="2989566329"/>
       </p:ext>
     </p:extLst>
   </p:cSld>
@@ -16867,6 +16977,154 @@
       </p:grpSpPr>
       <p:sp>
         <p:nvSpPr>
+          <p:cNvPr id="2" name="Title 1"/>
+          <p:cNvSpPr>
+            <a:spLocks noGrp="1"/>
+          </p:cNvSpPr>
+          <p:nvPr>
+            <p:ph type="title"/>
+          </p:nvPr>
+        </p:nvSpPr>
+        <p:spPr/>
+        <p:txBody>
+          <a:bodyPr/>
+          <a:lstStyle/>
+          <a:p>
+            <a:r>
+              <a:rPr lang="en-GB" dirty="0" smtClean="0"/>
+              <a:t>Memory Grants &amp; Spills</a:t>
+            </a:r>
+            <a:endParaRPr lang="en-GB" dirty="0"/>
+          </a:p>
+        </p:txBody>
+      </p:sp>
+      <p:sp>
+        <p:nvSpPr>
+          <p:cNvPr id="3" name="Content Placeholder 2"/>
+          <p:cNvSpPr>
+            <a:spLocks noGrp="1"/>
+          </p:cNvSpPr>
+          <p:nvPr>
+            <p:ph idx="1"/>
+          </p:nvPr>
+        </p:nvSpPr>
+        <p:spPr/>
+        <p:txBody>
+          <a:bodyPr>
+            <a:normAutofit lnSpcReduction="10000"/>
+          </a:bodyPr>
+          <a:lstStyle/>
+          <a:p>
+            <a:r>
+              <a:rPr lang="en-GB" dirty="0" smtClean="0"/>
+              <a:t>Working memory space required to complete query</a:t>
+            </a:r>
+          </a:p>
+          <a:p>
+            <a:r>
+              <a:rPr lang="en-GB" dirty="0" smtClean="0"/>
+              <a:t>Lack of memory causes RESOURCE_SEMAPHORE waits</a:t>
+            </a:r>
+          </a:p>
+          <a:p>
+            <a:r>
+              <a:rPr lang="en-GB" dirty="0" smtClean="0"/>
+              <a:t>Memory grant is estimated</a:t>
+            </a:r>
+          </a:p>
+          <a:p>
+            <a:pPr lvl="1"/>
+            <a:r>
+              <a:rPr lang="en-GB" dirty="0" smtClean="0"/>
+              <a:t>Based on estimated rows expected from each operator</a:t>
+            </a:r>
+          </a:p>
+          <a:p>
+            <a:pPr lvl="1"/>
+            <a:r>
+              <a:rPr lang="en-GB" dirty="0" smtClean="0"/>
+              <a:t>Estimated space required to perform joins and aggregations</a:t>
+            </a:r>
+          </a:p>
+          <a:p>
+            <a:r>
+              <a:rPr lang="en-GB" dirty="0" smtClean="0"/>
+              <a:t>If under estimated the query will “spill” to </a:t>
+            </a:r>
+            <a:r>
+              <a:rPr lang="en-GB" dirty="0" err="1" smtClean="0"/>
+              <a:t>tempDB</a:t>
+            </a:r>
+            <a:endParaRPr lang="en-GB" dirty="0" smtClean="0"/>
+          </a:p>
+          <a:p>
+            <a:pPr lvl="1"/>
+            <a:r>
+              <a:rPr lang="en-GB" dirty="0" smtClean="0"/>
+              <a:t>This is very bad</a:t>
+            </a:r>
+          </a:p>
+          <a:p>
+            <a:r>
+              <a:rPr lang="en-GB" dirty="0" smtClean="0"/>
+              <a:t>If heavily over estimated the server may run out of memory</a:t>
+            </a:r>
+          </a:p>
+          <a:p>
+            <a:pPr lvl="1"/>
+            <a:endParaRPr lang="en-GB" dirty="0" smtClean="0"/>
+          </a:p>
+          <a:p>
+            <a:endParaRPr lang="en-GB" dirty="0" smtClean="0"/>
+          </a:p>
+          <a:p>
+            <a:endParaRPr lang="en-GB" dirty="0" smtClean="0"/>
+          </a:p>
+          <a:p>
+            <a:pPr lvl="1"/>
+            <a:endParaRPr lang="en-GB" dirty="0"/>
+          </a:p>
+        </p:txBody>
+      </p:sp>
+    </p:spTree>
+    <p:extLst>
+      <p:ext uri="{BB962C8B-B14F-4D97-AF65-F5344CB8AC3E}">
+        <p14:creationId xmlns:p14="http://schemas.microsoft.com/office/powerpoint/2010/main" val="4114035203"/>
+      </p:ext>
+    </p:extLst>
+  </p:cSld>
+  <p:clrMapOvr>
+    <a:masterClrMapping/>
+  </p:clrMapOvr>
+  <p:timing>
+    <p:tnLst>
+      <p:par>
+        <p:cTn id="1" dur="indefinite" restart="never" nodeType="tmRoot"/>
+      </p:par>
+    </p:tnLst>
+  </p:timing>
+</p:sld>
+</file>
+
+<file path=ppt/slides/slide32.xml><?xml version="1.0" encoding="utf-8"?>
+<p:sld xmlns:a="http://schemas.openxmlformats.org/drawingml/2006/main" xmlns:r="http://schemas.openxmlformats.org/officeDocument/2006/relationships" xmlns:p="http://schemas.openxmlformats.org/presentationml/2006/main">
+  <p:cSld>
+    <p:spTree>
+      <p:nvGrpSpPr>
+        <p:cNvPr id="1" name=""/>
+        <p:cNvGrpSpPr/>
+        <p:nvPr/>
+      </p:nvGrpSpPr>
+      <p:grpSpPr>
+        <a:xfrm>
+          <a:off x="0" y="0"/>
+          <a:ext cx="0" cy="0"/>
+          <a:chOff x="0" y="0"/>
+          <a:chExt cx="0" cy="0"/>
+        </a:xfrm>
+      </p:grpSpPr>
+      <p:sp>
+        <p:nvSpPr>
           <p:cNvPr id="4" name="Title 3"/>
           <p:cNvSpPr>
             <a:spLocks noGrp="1"/>
@@ -16927,7 +17185,7 @@
 </p:sld>
 </file>
 
-<file path=ppt/slides/slide32.xml><?xml version="1.0" encoding="utf-8"?>
+<file path=ppt/slides/slide33.xml><?xml version="1.0" encoding="utf-8"?>
 <p:sld xmlns:a="http://schemas.openxmlformats.org/drawingml/2006/main" xmlns:r="http://schemas.openxmlformats.org/officeDocument/2006/relationships" xmlns:p="http://schemas.openxmlformats.org/presentationml/2006/main">
   <p:cSld>
     <p:spTree>
@@ -17030,7 +17288,7 @@
 </p:sld>
 </file>
 
-<file path=ppt/slides/slide33.xml><?xml version="1.0" encoding="utf-8"?>
+<file path=ppt/slides/slide34.xml><?xml version="1.0" encoding="utf-8"?>
 <p:sld xmlns:a="http://schemas.openxmlformats.org/drawingml/2006/main" xmlns:r="http://schemas.openxmlformats.org/officeDocument/2006/relationships" xmlns:p="http://schemas.openxmlformats.org/presentationml/2006/main">
   <p:cSld>
     <p:spTree>
@@ -17231,7 +17489,7 @@
 </p:sld>
 </file>
 
-<file path=ppt/slides/slide34.xml><?xml version="1.0" encoding="utf-8"?>
+<file path=ppt/slides/slide35.xml><?xml version="1.0" encoding="utf-8"?>
 <p:sld xmlns:a="http://schemas.openxmlformats.org/drawingml/2006/main" xmlns:r="http://schemas.openxmlformats.org/officeDocument/2006/relationships" xmlns:p="http://schemas.openxmlformats.org/presentationml/2006/main">
   <p:cSld>
     <p:spTree>
@@ -17505,7 +17763,7 @@
 </p:sld>
 </file>
 
-<file path=ppt/slides/slide35.xml><?xml version="1.0" encoding="utf-8"?>
+<file path=ppt/slides/slide36.xml><?xml version="1.0" encoding="utf-8"?>
 <p:sld xmlns:a="http://schemas.openxmlformats.org/drawingml/2006/main" xmlns:r="http://schemas.openxmlformats.org/officeDocument/2006/relationships" xmlns:p="http://schemas.openxmlformats.org/presentationml/2006/main">
   <p:cSld>
     <p:spTree>
@@ -17772,7 +18030,7 @@
 </p:sld>
 </file>
 
-<file path=ppt/slides/slide36.xml><?xml version="1.0" encoding="utf-8"?>
+<file path=ppt/slides/slide37.xml><?xml version="1.0" encoding="utf-8"?>
 <p:sld xmlns:a="http://schemas.openxmlformats.org/drawingml/2006/main" xmlns:r="http://schemas.openxmlformats.org/officeDocument/2006/relationships" xmlns:p="http://schemas.openxmlformats.org/presentationml/2006/main">
   <p:cSld>
     <p:spTree>
@@ -17963,101 +18221,6 @@
 </p:sld>
 </file>
 
-<file path=ppt/slides/slide37.xml><?xml version="1.0" encoding="utf-8"?>
-<p:sld xmlns:a="http://schemas.openxmlformats.org/drawingml/2006/main" xmlns:r="http://schemas.openxmlformats.org/officeDocument/2006/relationships" xmlns:p="http://schemas.openxmlformats.org/presentationml/2006/main">
-  <p:cSld>
-    <p:spTree>
-      <p:nvGrpSpPr>
-        <p:cNvPr id="1" name=""/>
-        <p:cNvGrpSpPr/>
-        <p:nvPr/>
-      </p:nvGrpSpPr>
-      <p:grpSpPr>
-        <a:xfrm>
-          <a:off x="0" y="0"/>
-          <a:ext cx="0" cy="0"/>
-          <a:chOff x="0" y="0"/>
-          <a:chExt cx="0" cy="0"/>
-        </a:xfrm>
-      </p:grpSpPr>
-      <p:sp>
-        <p:nvSpPr>
-          <p:cNvPr id="2" name="Title 1"/>
-          <p:cNvSpPr>
-            <a:spLocks noGrp="1"/>
-          </p:cNvSpPr>
-          <p:nvPr>
-            <p:ph type="title"/>
-          </p:nvPr>
-        </p:nvSpPr>
-        <p:spPr/>
-        <p:txBody>
-          <a:bodyPr/>
-          <a:lstStyle/>
-          <a:p>
-            <a:r>
-              <a:rPr lang="en-GB" dirty="0" smtClean="0"/>
-              <a:t>Demo</a:t>
-            </a:r>
-            <a:endParaRPr lang="en-GB" dirty="0"/>
-          </a:p>
-        </p:txBody>
-      </p:sp>
-      <p:sp>
-        <p:nvSpPr>
-          <p:cNvPr id="3" name="Content Placeholder 2"/>
-          <p:cNvSpPr>
-            <a:spLocks noGrp="1"/>
-          </p:cNvSpPr>
-          <p:nvPr>
-            <p:ph idx="1"/>
-          </p:nvPr>
-        </p:nvSpPr>
-        <p:spPr/>
-        <p:txBody>
-          <a:bodyPr/>
-          <a:lstStyle/>
-          <a:p>
-            <a:r>
-              <a:rPr lang="en-GB" dirty="0" smtClean="0"/>
-              <a:t>Finding a plan</a:t>
-            </a:r>
-          </a:p>
-          <a:p>
-            <a:r>
-              <a:rPr lang="en-GB" dirty="0" smtClean="0"/>
-              <a:t>Viewing the plan</a:t>
-            </a:r>
-          </a:p>
-          <a:p>
-            <a:r>
-              <a:rPr lang="en-GB" dirty="0" smtClean="0"/>
-              <a:t>Looking at the memory grant &amp; cost</a:t>
-            </a:r>
-            <a:endParaRPr lang="en-GB" dirty="0"/>
-          </a:p>
-        </p:txBody>
-      </p:sp>
-    </p:spTree>
-    <p:extLst>
-      <p:ext uri="{BB962C8B-B14F-4D97-AF65-F5344CB8AC3E}">
-        <p14:creationId xmlns:p14="http://schemas.microsoft.com/office/powerpoint/2010/main" val="1836877953"/>
-      </p:ext>
-    </p:extLst>
-  </p:cSld>
-  <p:clrMapOvr>
-    <a:masterClrMapping/>
-  </p:clrMapOvr>
-  <p:timing>
-    <p:tnLst>
-      <p:par>
-        <p:cTn id="1" dur="indefinite" restart="never" nodeType="tmRoot"/>
-      </p:par>
-    </p:tnLst>
-  </p:timing>
-</p:sld>
-</file>
-
 <file path=ppt/slides/slide38.xml><?xml version="1.0" encoding="utf-8"?>
 <p:sld xmlns:a="http://schemas.openxmlformats.org/drawingml/2006/main" xmlns:r="http://schemas.openxmlformats.org/officeDocument/2006/relationships" xmlns:p="http://schemas.openxmlformats.org/presentationml/2006/main">
   <p:cSld>
@@ -18077,7 +18240,7 @@
       </p:grpSpPr>
       <p:sp>
         <p:nvSpPr>
-          <p:cNvPr id="4" name="Title 3"/>
+          <p:cNvPr id="2" name="Title 1"/>
           <p:cNvSpPr>
             <a:spLocks noGrp="1"/>
           </p:cNvSpPr>
@@ -18092,7 +18255,7 @@
           <a:p>
             <a:r>
               <a:rPr lang="en-GB" dirty="0" smtClean="0"/>
-              <a:t>Hints</a:t>
+              <a:t>What to look for in plans</a:t>
             </a:r>
             <a:endParaRPr lang="en-GB" dirty="0"/>
           </a:p>
@@ -18100,12 +18263,12 @@
       </p:sp>
       <p:sp>
         <p:nvSpPr>
-          <p:cNvPr id="5" name="Text Placeholder 4"/>
+          <p:cNvPr id="3" name="Content Placeholder 2"/>
           <p:cNvSpPr>
             <a:spLocks noGrp="1"/>
           </p:cNvSpPr>
           <p:nvPr>
-            <p:ph type="body" idx="1"/>
+            <p:ph idx="1"/>
           </p:nvPr>
         </p:nvSpPr>
         <p:spPr/>
@@ -18113,27 +18276,66 @@
           <a:bodyPr/>
           <a:lstStyle/>
           <a:p>
-            <a:endParaRPr lang="en-GB"/>
+            <a:r>
+              <a:rPr lang="en-GB" dirty="0" smtClean="0"/>
+              <a:t>Actuals vs Estimates</a:t>
+            </a:r>
+          </a:p>
+          <a:p>
+            <a:pPr lvl="1"/>
+            <a:r>
+              <a:rPr lang="en-GB" dirty="0" smtClean="0"/>
+              <a:t>Statistics out of date?</a:t>
+            </a:r>
+          </a:p>
+          <a:p>
+            <a:r>
+              <a:rPr lang="en-GB" dirty="0" smtClean="0"/>
+              <a:t>Large arrows between operators</a:t>
+            </a:r>
+          </a:p>
+          <a:p>
+            <a:pPr lvl="1"/>
+            <a:r>
+              <a:rPr lang="en-GB" dirty="0" smtClean="0"/>
+              <a:t>Usually from excessive scanning</a:t>
+            </a:r>
+          </a:p>
+          <a:p>
+            <a:pPr lvl="1"/>
+            <a:r>
+              <a:rPr lang="en-GB" dirty="0" smtClean="0"/>
+              <a:t>Missing indexes? </a:t>
+            </a:r>
+          </a:p>
+          <a:p>
+            <a:pPr lvl="1"/>
+            <a:r>
+              <a:rPr lang="en-GB" dirty="0" smtClean="0"/>
+              <a:t>Poor predicates?</a:t>
+            </a:r>
+          </a:p>
+          <a:p>
+            <a:r>
+              <a:rPr lang="en-GB" dirty="0" smtClean="0"/>
+              <a:t>Warnings (Yellow exclamation marks)</a:t>
+            </a:r>
+          </a:p>
+          <a:p>
+            <a:endParaRPr lang="en-GB" dirty="0"/>
           </a:p>
         </p:txBody>
       </p:sp>
     </p:spTree>
     <p:extLst>
       <p:ext uri="{BB962C8B-B14F-4D97-AF65-F5344CB8AC3E}">
-        <p14:creationId xmlns:p14="http://schemas.microsoft.com/office/powerpoint/2010/main" val="333528818"/>
+        <p14:creationId xmlns:p14="http://schemas.microsoft.com/office/powerpoint/2010/main" val="3790498457"/>
       </p:ext>
     </p:extLst>
   </p:cSld>
   <p:clrMapOvr>
     <a:masterClrMapping/>
   </p:clrMapOvr>
-  <p:timing>
-    <p:tnLst>
-      <p:par>
-        <p:cTn id="1" dur="indefinite" restart="never" nodeType="tmRoot"/>
-      </p:par>
-    </p:tnLst>
-  </p:timing>
 </p:sld>
 </file>
 
@@ -18156,7 +18358,7 @@
       </p:grpSpPr>
       <p:sp>
         <p:nvSpPr>
-          <p:cNvPr id="2" name="Title 1"/>
+          <p:cNvPr id="4" name="Title 3"/>
           <p:cNvSpPr>
             <a:spLocks noGrp="1"/>
           </p:cNvSpPr>
@@ -18179,93 +18381,27 @@
       </p:sp>
       <p:sp>
         <p:nvSpPr>
-          <p:cNvPr id="3" name="Content Placeholder 2"/>
+          <p:cNvPr id="5" name="Text Placeholder 4"/>
           <p:cNvSpPr>
             <a:spLocks noGrp="1"/>
           </p:cNvSpPr>
           <p:nvPr>
-            <p:ph idx="1"/>
+            <p:ph type="body" idx="1"/>
           </p:nvPr>
         </p:nvSpPr>
         <p:spPr/>
         <p:txBody>
-          <a:bodyPr>
-            <a:normAutofit fontScale="92500" lnSpcReduction="20000"/>
-          </a:bodyPr>
+          <a:bodyPr/>
           <a:lstStyle/>
           <a:p>
-            <a:r>
-              <a:rPr lang="en-GB" dirty="0" smtClean="0"/>
-              <a:t>RECOMPILE/With Recompile</a:t>
-            </a:r>
-          </a:p>
-          <a:p>
-            <a:pPr lvl="1"/>
-            <a:r>
-              <a:rPr lang="en-GB" dirty="0" smtClean="0"/>
-              <a:t>Prevents the plan from being cached</a:t>
-            </a:r>
-          </a:p>
-          <a:p>
-            <a:pPr lvl="1"/>
-            <a:r>
-              <a:rPr lang="en-GB" dirty="0" smtClean="0"/>
-              <a:t>Parameterisation will not take place</a:t>
-            </a:r>
-          </a:p>
-          <a:p>
-            <a:r>
-              <a:rPr lang="en-GB" dirty="0" smtClean="0"/>
-              <a:t>FORCE ORDER</a:t>
-            </a:r>
-          </a:p>
-          <a:p>
-            <a:r>
-              <a:rPr lang="en-GB" dirty="0" smtClean="0"/>
-              <a:t>MERGE/HASH/LOOP Join</a:t>
-            </a:r>
-          </a:p>
-          <a:p>
-            <a:r>
-              <a:rPr lang="en-GB" dirty="0" smtClean="0"/>
-              <a:t>FORCE SEEK/SCAN</a:t>
-            </a:r>
-          </a:p>
-          <a:p>
-            <a:r>
-              <a:rPr lang="en-GB" dirty="0" smtClean="0"/>
-              <a:t>MAXDOP</a:t>
-            </a:r>
-          </a:p>
-          <a:p>
-            <a:r>
-              <a:rPr lang="en-GB" dirty="0" smtClean="0"/>
-              <a:t>INDEX [</a:t>
-            </a:r>
-            <a:r>
-              <a:rPr lang="en-GB" dirty="0" err="1" smtClean="0"/>
-              <a:t>IndexName</a:t>
-            </a:r>
-            <a:r>
-              <a:rPr lang="en-GB" dirty="0" smtClean="0"/>
-              <a:t>]</a:t>
-            </a:r>
-          </a:p>
-          <a:p>
-            <a:r>
-              <a:rPr lang="en-GB" dirty="0" smtClean="0"/>
-              <a:t>OPTIMIZE FOR/UNKNOWN</a:t>
-            </a:r>
-          </a:p>
-          <a:p>
-            <a:endParaRPr lang="en-GB" dirty="0"/>
+            <a:endParaRPr lang="en-GB"/>
           </a:p>
         </p:txBody>
       </p:sp>
     </p:spTree>
     <p:extLst>
       <p:ext uri="{BB962C8B-B14F-4D97-AF65-F5344CB8AC3E}">
-        <p14:creationId xmlns:p14="http://schemas.microsoft.com/office/powerpoint/2010/main" val="2038152599"/>
+        <p14:creationId xmlns:p14="http://schemas.microsoft.com/office/powerpoint/2010/main" val="333528818"/>
       </p:ext>
     </p:extLst>
   </p:cSld>
@@ -18301,6 +18437,230 @@
       </p:grpSpPr>
       <p:sp>
         <p:nvSpPr>
+          <p:cNvPr id="4" name="Title 3"/>
+          <p:cNvSpPr>
+            <a:spLocks noGrp="1"/>
+          </p:cNvSpPr>
+          <p:nvPr>
+            <p:ph type="title"/>
+          </p:nvPr>
+        </p:nvSpPr>
+        <p:spPr/>
+        <p:txBody>
+          <a:bodyPr/>
+          <a:lstStyle/>
+          <a:p>
+            <a:r>
+              <a:rPr lang="en-GB" dirty="0" smtClean="0"/>
+              <a:t>Query Plans</a:t>
+            </a:r>
+            <a:endParaRPr lang="en-GB" dirty="0"/>
+          </a:p>
+        </p:txBody>
+      </p:sp>
+      <p:sp>
+        <p:nvSpPr>
+          <p:cNvPr id="5" name="Text Placeholder 4"/>
+          <p:cNvSpPr>
+            <a:spLocks noGrp="1"/>
+          </p:cNvSpPr>
+          <p:nvPr>
+            <p:ph type="body" idx="1"/>
+          </p:nvPr>
+        </p:nvSpPr>
+        <p:spPr/>
+        <p:txBody>
+          <a:bodyPr/>
+          <a:lstStyle/>
+          <a:p>
+            <a:endParaRPr lang="en-GB"/>
+          </a:p>
+        </p:txBody>
+      </p:sp>
+    </p:spTree>
+    <p:extLst>
+      <p:ext uri="{BB962C8B-B14F-4D97-AF65-F5344CB8AC3E}">
+        <p14:creationId xmlns:p14="http://schemas.microsoft.com/office/powerpoint/2010/main" val="3916409609"/>
+      </p:ext>
+    </p:extLst>
+  </p:cSld>
+  <p:clrMapOvr>
+    <a:masterClrMapping/>
+  </p:clrMapOvr>
+  <p:timing>
+    <p:tnLst>
+      <p:par>
+        <p:cTn id="1" dur="indefinite" restart="never" nodeType="tmRoot"/>
+      </p:par>
+    </p:tnLst>
+  </p:timing>
+</p:sld>
+</file>
+
+<file path=ppt/slides/slide40.xml><?xml version="1.0" encoding="utf-8"?>
+<p:sld xmlns:a="http://schemas.openxmlformats.org/drawingml/2006/main" xmlns:r="http://schemas.openxmlformats.org/officeDocument/2006/relationships" xmlns:p="http://schemas.openxmlformats.org/presentationml/2006/main">
+  <p:cSld>
+    <p:spTree>
+      <p:nvGrpSpPr>
+        <p:cNvPr id="1" name=""/>
+        <p:cNvGrpSpPr/>
+        <p:nvPr/>
+      </p:nvGrpSpPr>
+      <p:grpSpPr>
+        <a:xfrm>
+          <a:off x="0" y="0"/>
+          <a:ext cx="0" cy="0"/>
+          <a:chOff x="0" y="0"/>
+          <a:chExt cx="0" cy="0"/>
+        </a:xfrm>
+      </p:grpSpPr>
+      <p:sp>
+        <p:nvSpPr>
+          <p:cNvPr id="2" name="Title 1"/>
+          <p:cNvSpPr>
+            <a:spLocks noGrp="1"/>
+          </p:cNvSpPr>
+          <p:nvPr>
+            <p:ph type="title"/>
+          </p:nvPr>
+        </p:nvSpPr>
+        <p:spPr/>
+        <p:txBody>
+          <a:bodyPr/>
+          <a:lstStyle/>
+          <a:p>
+            <a:r>
+              <a:rPr lang="en-GB" dirty="0" smtClean="0"/>
+              <a:t>Hints</a:t>
+            </a:r>
+            <a:endParaRPr lang="en-GB" dirty="0"/>
+          </a:p>
+        </p:txBody>
+      </p:sp>
+      <p:sp>
+        <p:nvSpPr>
+          <p:cNvPr id="3" name="Content Placeholder 2"/>
+          <p:cNvSpPr>
+            <a:spLocks noGrp="1"/>
+          </p:cNvSpPr>
+          <p:nvPr>
+            <p:ph idx="1"/>
+          </p:nvPr>
+        </p:nvSpPr>
+        <p:spPr/>
+        <p:txBody>
+          <a:bodyPr>
+            <a:normAutofit fontScale="92500" lnSpcReduction="20000"/>
+          </a:bodyPr>
+          <a:lstStyle/>
+          <a:p>
+            <a:r>
+              <a:rPr lang="en-GB" dirty="0" smtClean="0"/>
+              <a:t>RECOMPILE/With Recompile</a:t>
+            </a:r>
+          </a:p>
+          <a:p>
+            <a:pPr lvl="1"/>
+            <a:r>
+              <a:rPr lang="en-GB" dirty="0" smtClean="0"/>
+              <a:t>Prevents the plan from being cached</a:t>
+            </a:r>
+          </a:p>
+          <a:p>
+            <a:pPr lvl="1"/>
+            <a:r>
+              <a:rPr lang="en-GB" dirty="0" smtClean="0"/>
+              <a:t>Parameterisation will not take place</a:t>
+            </a:r>
+          </a:p>
+          <a:p>
+            <a:r>
+              <a:rPr lang="en-GB" dirty="0" smtClean="0"/>
+              <a:t>FORCE ORDER</a:t>
+            </a:r>
+          </a:p>
+          <a:p>
+            <a:r>
+              <a:rPr lang="en-GB" dirty="0" smtClean="0"/>
+              <a:t>MERGE/HASH/LOOP Join</a:t>
+            </a:r>
+          </a:p>
+          <a:p>
+            <a:r>
+              <a:rPr lang="en-GB" dirty="0" smtClean="0"/>
+              <a:t>FORCE SEEK/SCAN</a:t>
+            </a:r>
+          </a:p>
+          <a:p>
+            <a:r>
+              <a:rPr lang="en-GB" dirty="0" smtClean="0"/>
+              <a:t>MAXDOP</a:t>
+            </a:r>
+          </a:p>
+          <a:p>
+            <a:r>
+              <a:rPr lang="en-GB" dirty="0" smtClean="0"/>
+              <a:t>INDEX [</a:t>
+            </a:r>
+            <a:r>
+              <a:rPr lang="en-GB" dirty="0" err="1" smtClean="0"/>
+              <a:t>IndexName</a:t>
+            </a:r>
+            <a:r>
+              <a:rPr lang="en-GB" dirty="0" smtClean="0"/>
+              <a:t>]</a:t>
+            </a:r>
+          </a:p>
+          <a:p>
+            <a:r>
+              <a:rPr lang="en-GB" dirty="0" smtClean="0"/>
+              <a:t>OPTIMIZE FOR/UNKNOWN</a:t>
+            </a:r>
+          </a:p>
+          <a:p>
+            <a:endParaRPr lang="en-GB" dirty="0"/>
+          </a:p>
+        </p:txBody>
+      </p:sp>
+    </p:spTree>
+    <p:extLst>
+      <p:ext uri="{BB962C8B-B14F-4D97-AF65-F5344CB8AC3E}">
+        <p14:creationId xmlns:p14="http://schemas.microsoft.com/office/powerpoint/2010/main" val="2038152599"/>
+      </p:ext>
+    </p:extLst>
+  </p:cSld>
+  <p:clrMapOvr>
+    <a:masterClrMapping/>
+  </p:clrMapOvr>
+  <p:timing>
+    <p:tnLst>
+      <p:par>
+        <p:cTn id="1" dur="indefinite" restart="never" nodeType="tmRoot"/>
+      </p:par>
+    </p:tnLst>
+  </p:timing>
+</p:sld>
+</file>
+
+<file path=ppt/slides/slide5.xml><?xml version="1.0" encoding="utf-8"?>
+<p:sld xmlns:a="http://schemas.openxmlformats.org/drawingml/2006/main" xmlns:r="http://schemas.openxmlformats.org/officeDocument/2006/relationships" xmlns:p="http://schemas.openxmlformats.org/presentationml/2006/main">
+  <p:cSld>
+    <p:spTree>
+      <p:nvGrpSpPr>
+        <p:cNvPr id="1" name=""/>
+        <p:cNvGrpSpPr/>
+        <p:nvPr/>
+      </p:nvGrpSpPr>
+      <p:grpSpPr>
+        <a:xfrm>
+          <a:off x="0" y="0"/>
+          <a:ext cx="0" cy="0"/>
+          <a:chOff x="0" y="0"/>
+          <a:chExt cx="0" cy="0"/>
+        </a:xfrm>
+      </p:grpSpPr>
+      <p:sp>
+        <p:nvSpPr>
           <p:cNvPr id="2" name="Title 1"/>
           <p:cNvSpPr>
             <a:spLocks noGrp="1"/>
@@ -18395,7 +18755,7 @@
 </p:sld>
 </file>
 
-<file path=ppt/slides/slide5.xml><?xml version="1.0" encoding="utf-8"?>
+<file path=ppt/slides/slide6.xml><?xml version="1.0" encoding="utf-8"?>
 <p:sld xmlns:a="http://schemas.openxmlformats.org/drawingml/2006/main" xmlns:r="http://schemas.openxmlformats.org/officeDocument/2006/relationships" xmlns:p="http://schemas.openxmlformats.org/presentationml/2006/main">
   <p:cSld>
     <p:spTree>
@@ -18541,129 +18901,6 @@
 </p:sld>
 </file>
 
-<file path=ppt/slides/slide6.xml><?xml version="1.0" encoding="utf-8"?>
-<p:sld xmlns:a="http://schemas.openxmlformats.org/drawingml/2006/main" xmlns:r="http://schemas.openxmlformats.org/officeDocument/2006/relationships" xmlns:p="http://schemas.openxmlformats.org/presentationml/2006/main">
-  <p:cSld>
-    <p:spTree>
-      <p:nvGrpSpPr>
-        <p:cNvPr id="1" name=""/>
-        <p:cNvGrpSpPr/>
-        <p:nvPr/>
-      </p:nvGrpSpPr>
-      <p:grpSpPr>
-        <a:xfrm>
-          <a:off x="0" y="0"/>
-          <a:ext cx="0" cy="0"/>
-          <a:chOff x="0" y="0"/>
-          <a:chExt cx="0" cy="0"/>
-        </a:xfrm>
-      </p:grpSpPr>
-      <p:sp>
-        <p:nvSpPr>
-          <p:cNvPr id="2" name="Title 1"/>
-          <p:cNvSpPr>
-            <a:spLocks noGrp="1"/>
-          </p:cNvSpPr>
-          <p:nvPr>
-            <p:ph type="title"/>
-          </p:nvPr>
-        </p:nvSpPr>
-        <p:spPr/>
-        <p:txBody>
-          <a:bodyPr/>
-          <a:lstStyle/>
-          <a:p>
-            <a:r>
-              <a:rPr lang="en-GB" dirty="0" smtClean="0"/>
-              <a:t>What is a Plan?</a:t>
-            </a:r>
-            <a:endParaRPr lang="en-GB" dirty="0"/>
-          </a:p>
-        </p:txBody>
-      </p:sp>
-      <p:sp>
-        <p:nvSpPr>
-          <p:cNvPr id="3" name="Content Placeholder 2"/>
-          <p:cNvSpPr>
-            <a:spLocks noGrp="1"/>
-          </p:cNvSpPr>
-          <p:nvPr>
-            <p:ph idx="1"/>
-          </p:nvPr>
-        </p:nvSpPr>
-        <p:spPr/>
-        <p:txBody>
-          <a:bodyPr/>
-          <a:lstStyle/>
-          <a:p>
-            <a:r>
-              <a:rPr lang="en-GB" dirty="0" smtClean="0"/>
-              <a:t>Calculated method to complete a given task</a:t>
-            </a:r>
-          </a:p>
-          <a:p>
-            <a:r>
-              <a:rPr lang="en-GB" dirty="0" smtClean="0"/>
-              <a:t>How?</a:t>
-            </a:r>
-          </a:p>
-          <a:p>
-            <a:pPr lvl="1"/>
-            <a:r>
-              <a:rPr lang="en-GB" dirty="0" smtClean="0"/>
-              <a:t>Indexes</a:t>
-            </a:r>
-          </a:p>
-          <a:p>
-            <a:pPr lvl="1"/>
-            <a:r>
-              <a:rPr lang="en-GB" dirty="0" smtClean="0"/>
-              <a:t>Statistics</a:t>
-            </a:r>
-          </a:p>
-          <a:p>
-            <a:pPr lvl="1"/>
-            <a:r>
-              <a:rPr lang="en-GB" dirty="0" smtClean="0"/>
-              <a:t>Hints</a:t>
-            </a:r>
-          </a:p>
-          <a:p>
-            <a:r>
-              <a:rPr lang="en-GB" dirty="0" smtClean="0"/>
-              <a:t>Estimated Plans vs Actual Plans</a:t>
-            </a:r>
-          </a:p>
-          <a:p>
-            <a:pPr lvl="1"/>
-            <a:r>
-              <a:rPr lang="en-GB" dirty="0" smtClean="0"/>
-              <a:t>Actually the same thing, one just has the actual counts/cost during execution</a:t>
-            </a:r>
-            <a:endParaRPr lang="en-GB" dirty="0"/>
-          </a:p>
-        </p:txBody>
-      </p:sp>
-    </p:spTree>
-    <p:extLst>
-      <p:ext uri="{BB962C8B-B14F-4D97-AF65-F5344CB8AC3E}">
-        <p14:creationId xmlns:p14="http://schemas.microsoft.com/office/powerpoint/2010/main" val="1233659612"/>
-      </p:ext>
-    </p:extLst>
-  </p:cSld>
-  <p:clrMapOvr>
-    <a:masterClrMapping/>
-  </p:clrMapOvr>
-  <p:timing>
-    <p:tnLst>
-      <p:par>
-        <p:cTn id="1" dur="indefinite" restart="never" nodeType="tmRoot"/>
-      </p:par>
-    </p:tnLst>
-  </p:timing>
-</p:sld>
-</file>
-
 <file path=ppt/slides/slide7.xml><?xml version="1.0" encoding="utf-8"?>
 <p:sld xmlns:a="http://schemas.openxmlformats.org/drawingml/2006/main" xmlns:r="http://schemas.openxmlformats.org/officeDocument/2006/relationships" xmlns:p="http://schemas.openxmlformats.org/presentationml/2006/main">
   <p:cSld>
@@ -18698,7 +18935,7 @@
           <a:p>
             <a:r>
               <a:rPr lang="en-GB" dirty="0" smtClean="0"/>
-              <a:t>Query Plans</a:t>
+              <a:t>What is a Plan?</a:t>
             </a:r>
             <a:endParaRPr lang="en-GB" dirty="0"/>
           </a:p>
@@ -18716,74 +18953,52 @@
         </p:nvSpPr>
         <p:spPr/>
         <p:txBody>
-          <a:bodyPr>
-            <a:normAutofit fontScale="92500" lnSpcReduction="20000"/>
-          </a:bodyPr>
+          <a:bodyPr/>
           <a:lstStyle/>
           <a:p>
             <a:r>
               <a:rPr lang="en-GB" dirty="0" smtClean="0"/>
-              <a:t>Cost</a:t>
-            </a:r>
-          </a:p>
-          <a:p>
-            <a:r>
-              <a:rPr lang="en-GB" dirty="0" smtClean="0"/>
-              <a:t>Operators</a:t>
+              <a:t>Calculated method to complete a given task</a:t>
+            </a:r>
+          </a:p>
+          <a:p>
+            <a:r>
+              <a:rPr lang="en-GB" dirty="0" smtClean="0"/>
+              <a:t>How?</a:t>
             </a:r>
           </a:p>
           <a:p>
             <a:pPr lvl="1"/>
             <a:r>
               <a:rPr lang="en-GB" dirty="0" smtClean="0"/>
-              <a:t>Seeks/Scans</a:t>
+              <a:t>Indexes</a:t>
             </a:r>
           </a:p>
           <a:p>
             <a:pPr lvl="1"/>
             <a:r>
               <a:rPr lang="en-GB" dirty="0" smtClean="0"/>
-              <a:t>Joins</a:t>
+              <a:t>Statistics</a:t>
             </a:r>
           </a:p>
           <a:p>
             <a:pPr lvl="1"/>
             <a:r>
               <a:rPr lang="en-GB" dirty="0" smtClean="0"/>
-              <a:t>Sorting</a:t>
+              <a:t>Hints</a:t>
+            </a:r>
+          </a:p>
+          <a:p>
+            <a:r>
+              <a:rPr lang="en-GB" dirty="0" smtClean="0"/>
+              <a:t>Estimated Plans vs Actual Plans</a:t>
             </a:r>
           </a:p>
           <a:p>
             <a:pPr lvl="1"/>
             <a:r>
               <a:rPr lang="en-GB" dirty="0" smtClean="0"/>
-              <a:t>Calculations</a:t>
-            </a:r>
-          </a:p>
-          <a:p>
-            <a:r>
-              <a:rPr lang="en-GB" dirty="0" smtClean="0"/>
-              <a:t>Indexing</a:t>
-            </a:r>
-          </a:p>
-          <a:p>
-            <a:pPr lvl="1"/>
-            <a:r>
-              <a:rPr lang="en-GB" dirty="0" smtClean="0"/>
-              <a:t>Covering indexes</a:t>
-            </a:r>
-          </a:p>
-          <a:p>
-            <a:pPr lvl="1"/>
-            <a:r>
-              <a:rPr lang="en-GB" dirty="0" smtClean="0"/>
-              <a:t>Sort order</a:t>
-            </a:r>
-          </a:p>
-          <a:p>
-            <a:r>
-              <a:rPr lang="en-GB" dirty="0" smtClean="0"/>
-              <a:t>Estimation</a:t>
+              <a:t>Actually the same thing, one just has the actual counts/cost during execution</a:t>
             </a:r>
             <a:endParaRPr lang="en-GB" dirty="0"/>
           </a:p>
@@ -18792,21 +19007,13 @@
     </p:spTree>
     <p:extLst>
       <p:ext uri="{BB962C8B-B14F-4D97-AF65-F5344CB8AC3E}">
-        <p14:creationId xmlns:p14="http://schemas.microsoft.com/office/powerpoint/2010/main" val="501372832"/>
+        <p14:creationId xmlns:p14="http://schemas.microsoft.com/office/powerpoint/2010/main" val="1233659612"/>
       </p:ext>
     </p:extLst>
   </p:cSld>
   <p:clrMapOvr>
     <a:masterClrMapping/>
   </p:clrMapOvr>
-  <mc:AlternateContent xmlns:mc="http://schemas.openxmlformats.org/markup-compatibility/2006" xmlns:p14="http://schemas.microsoft.com/office/powerpoint/2010/main">
-    <mc:Choice Requires="p14">
-      <p:transition spd="slow" p14:dur="2000"/>
-    </mc:Choice>
-    <mc:Fallback xmlns="">
-      <p:transition spd="slow"/>
-    </mc:Fallback>
-  </mc:AlternateContent>
   <p:timing>
     <p:tnLst>
       <p:par>
@@ -18851,7 +19058,7 @@
           <a:p>
             <a:r>
               <a:rPr lang="en-GB" dirty="0" smtClean="0"/>
-              <a:t>Cost</a:t>
+              <a:t>Query Plans</a:t>
             </a:r>
             <a:endParaRPr lang="en-GB" dirty="0"/>
           </a:p>
@@ -18870,58 +19077,73 @@
         <p:spPr/>
         <p:txBody>
           <a:bodyPr>
-            <a:normAutofit/>
+            <a:normAutofit fontScale="92500" lnSpcReduction="20000"/>
           </a:bodyPr>
           <a:lstStyle/>
           <a:p>
             <a:r>
               <a:rPr lang="en-GB" dirty="0" smtClean="0"/>
-              <a:t>Is based on a machine many years ago</a:t>
-            </a:r>
-          </a:p>
-          <a:p>
-            <a:r>
-              <a:rPr lang="en-GB" dirty="0" smtClean="0"/>
-              <a:t>Doesn't equate to anything specific</a:t>
-            </a:r>
-          </a:p>
-          <a:p>
-            <a:r>
-              <a:rPr lang="en-GB" dirty="0" smtClean="0"/>
-              <a:t>Useful for comparison</a:t>
-            </a:r>
-          </a:p>
-          <a:p>
-            <a:r>
-              <a:rPr lang="en-GB" dirty="0" smtClean="0"/>
-              <a:t>Shouldn't be used in isolation</a:t>
-            </a:r>
-          </a:p>
-          <a:p>
-            <a:r>
-              <a:rPr lang="en-GB" dirty="0" smtClean="0"/>
-              <a:t>Doesn't consider server state</a:t>
+              <a:t>Cost</a:t>
+            </a:r>
+          </a:p>
+          <a:p>
+            <a:r>
+              <a:rPr lang="en-GB" dirty="0" smtClean="0"/>
+              <a:t>Operators</a:t>
             </a:r>
           </a:p>
           <a:p>
             <a:pPr lvl="1"/>
             <a:r>
               <a:rPr lang="en-GB" dirty="0" smtClean="0"/>
-              <a:t>Available memory</a:t>
+              <a:t>Seeks/Scans</a:t>
             </a:r>
           </a:p>
           <a:p>
             <a:pPr lvl="1"/>
             <a:r>
               <a:rPr lang="en-GB" dirty="0" smtClean="0"/>
-              <a:t>Pages in memory already</a:t>
+              <a:t>Joins</a:t>
             </a:r>
           </a:p>
           <a:p>
             <a:pPr lvl="1"/>
             <a:r>
               <a:rPr lang="en-GB" dirty="0" smtClean="0"/>
-              <a:t>High end disk (ram disk, SSD)</a:t>
+              <a:t>Sorting</a:t>
+            </a:r>
+          </a:p>
+          <a:p>
+            <a:pPr lvl="1"/>
+            <a:r>
+              <a:rPr lang="en-GB" dirty="0" smtClean="0"/>
+              <a:t>Calculations</a:t>
+            </a:r>
+          </a:p>
+          <a:p>
+            <a:r>
+              <a:rPr lang="en-GB" dirty="0" smtClean="0"/>
+              <a:t>Indexing</a:t>
+            </a:r>
+          </a:p>
+          <a:p>
+            <a:pPr lvl="1"/>
+            <a:r>
+              <a:rPr lang="en-GB" dirty="0" smtClean="0"/>
+              <a:t>Covering indexes</a:t>
+            </a:r>
+          </a:p>
+          <a:p>
+            <a:pPr lvl="1"/>
+            <a:r>
+              <a:rPr lang="en-GB" dirty="0" smtClean="0"/>
+              <a:t>Sort order</a:t>
+            </a:r>
+          </a:p>
+          <a:p>
+            <a:r>
+              <a:rPr lang="en-GB" dirty="0" smtClean="0"/>
+              <a:t>Estimation</a:t>
             </a:r>
             <a:endParaRPr lang="en-GB" dirty="0"/>
           </a:p>
@@ -18930,7 +19152,7 @@
     </p:spTree>
     <p:extLst>
       <p:ext uri="{BB962C8B-B14F-4D97-AF65-F5344CB8AC3E}">
-        <p14:creationId xmlns:p14="http://schemas.microsoft.com/office/powerpoint/2010/main" val="1801466196"/>
+        <p14:creationId xmlns:p14="http://schemas.microsoft.com/office/powerpoint/2010/main" val="501372832"/>
       </p:ext>
     </p:extLst>
   </p:cSld>
@@ -18989,7 +19211,7 @@
           <a:p>
             <a:r>
               <a:rPr lang="en-GB" dirty="0" smtClean="0"/>
-              <a:t>Building a Plan</a:t>
+              <a:t>Cost</a:t>
             </a:r>
             <a:endParaRPr lang="en-GB" dirty="0"/>
           </a:p>
@@ -19007,43 +19229,60 @@
         </p:nvSpPr>
         <p:spPr/>
         <p:txBody>
-          <a:bodyPr/>
+          <a:bodyPr>
+            <a:normAutofit/>
+          </a:bodyPr>
           <a:lstStyle/>
           <a:p>
             <a:r>
               <a:rPr lang="en-GB" dirty="0" smtClean="0"/>
-              <a:t>Seek vs Scan</a:t>
-            </a:r>
-          </a:p>
-          <a:p>
-            <a:r>
-              <a:rPr lang="en-GB" dirty="0" smtClean="0"/>
-              <a:t>Choosing an Index</a:t>
+              <a:t>Is based on a machine many years ago</a:t>
+            </a:r>
+          </a:p>
+          <a:p>
+            <a:r>
+              <a:rPr lang="en-GB" dirty="0" smtClean="0"/>
+              <a:t>Doesn't equate to anything specific</a:t>
+            </a:r>
+          </a:p>
+          <a:p>
+            <a:r>
+              <a:rPr lang="en-GB" dirty="0" smtClean="0"/>
+              <a:t>Useful for comparison</a:t>
+            </a:r>
+          </a:p>
+          <a:p>
+            <a:r>
+              <a:rPr lang="en-GB" dirty="0" smtClean="0"/>
+              <a:t>Shouldn't be used in isolation</a:t>
+            </a:r>
+          </a:p>
+          <a:p>
+            <a:r>
+              <a:rPr lang="en-GB" dirty="0" smtClean="0"/>
+              <a:t>Doesn't consider server state</a:t>
             </a:r>
           </a:p>
           <a:p>
             <a:pPr lvl="1"/>
             <a:r>
               <a:rPr lang="en-GB" dirty="0" smtClean="0"/>
-              <a:t>Cardinality</a:t>
-            </a:r>
-          </a:p>
-          <a:p>
-            <a:r>
-              <a:rPr lang="en-GB" dirty="0" smtClean="0"/>
-              <a:t>Covering vs Non Covering</a:t>
-            </a:r>
-          </a:p>
-          <a:p>
-            <a:r>
-              <a:rPr lang="en-GB" dirty="0" smtClean="0"/>
-              <a:t>Filtered Indexes</a:t>
-            </a:r>
-          </a:p>
-          <a:p>
-            <a:endParaRPr lang="en-GB" dirty="0" smtClean="0"/>
-          </a:p>
-          <a:p>
+              <a:t>Available memory</a:t>
+            </a:r>
+          </a:p>
+          <a:p>
+            <a:pPr lvl="1"/>
+            <a:r>
+              <a:rPr lang="en-GB" dirty="0" smtClean="0"/>
+              <a:t>Pages in memory already</a:t>
+            </a:r>
+          </a:p>
+          <a:p>
+            <a:pPr lvl="1"/>
+            <a:r>
+              <a:rPr lang="en-GB" dirty="0" smtClean="0"/>
+              <a:t>High end disk (ram disk, SSD)</a:t>
+            </a:r>
             <a:endParaRPr lang="en-GB" dirty="0"/>
           </a:p>
         </p:txBody>
@@ -19051,13 +19290,21 @@
     </p:spTree>
     <p:extLst>
       <p:ext uri="{BB962C8B-B14F-4D97-AF65-F5344CB8AC3E}">
-        <p14:creationId xmlns:p14="http://schemas.microsoft.com/office/powerpoint/2010/main" val="2914966170"/>
+        <p14:creationId xmlns:p14="http://schemas.microsoft.com/office/powerpoint/2010/main" val="1801466196"/>
       </p:ext>
     </p:extLst>
   </p:cSld>
   <p:clrMapOvr>
     <a:masterClrMapping/>
   </p:clrMapOvr>
+  <mc:AlternateContent xmlns:mc="http://schemas.openxmlformats.org/markup-compatibility/2006" xmlns:p14="http://schemas.microsoft.com/office/powerpoint/2010/main">
+    <mc:Choice Requires="p14">
+      <p:transition spd="slow" p14:dur="2000"/>
+    </mc:Choice>
+    <mc:Fallback xmlns="">
+      <p:transition spd="slow"/>
+    </mc:Fallback>
+  </mc:AlternateContent>
   <p:timing>
     <p:tnLst>
       <p:par>

</xml_diff>

<commit_message>
slides minor corrections to memory grants
</commit_message>
<xml_diff>
--- a/Slides/3. Query Execution.pptx
+++ b/Slides/3. Query Execution.pptx
@@ -7297,7 +7297,7 @@
           <a:p>
             <a:fld id="{C33E546B-25B4-4054-B726-50ABAEF81226}" type="datetimeFigureOut">
               <a:rPr lang="en-GB" smtClean="0"/>
-              <a:t>15/02/2016</a:t>
+              <a:t>16/02/2016</a:t>
             </a:fld>
             <a:endParaRPr lang="en-GB"/>
           </a:p>
@@ -7837,11 +7837,7 @@
           <a:p>
             <a:r>
               <a:rPr lang="en-GB" dirty="0" smtClean="0"/>
-              <a:t>During this demo explain the parts of the query </a:t>
-            </a:r>
-            <a:r>
-              <a:rPr lang="en-GB" dirty="0" smtClean="0"/>
-              <a:t>plan</a:t>
+              <a:t>During this demo explain the parts of the query plan</a:t>
             </a:r>
           </a:p>
           <a:p>
@@ -8489,7 +8485,7 @@
           <a:p>
             <a:fld id="{8204E7FD-169F-464A-8003-B2893D8D8FF1}" type="datetimeFigureOut">
               <a:rPr lang="en-GB" smtClean="0"/>
-              <a:t>15/02/2016</a:t>
+              <a:t>16/02/2016</a:t>
             </a:fld>
             <a:endParaRPr lang="en-GB"/>
           </a:p>
@@ -8830,7 +8826,7 @@
           <a:p>
             <a:fld id="{8204E7FD-169F-464A-8003-B2893D8D8FF1}" type="datetimeFigureOut">
               <a:rPr lang="en-GB" smtClean="0"/>
-              <a:t>15/02/2016</a:t>
+              <a:t>16/02/2016</a:t>
             </a:fld>
             <a:endParaRPr lang="en-GB"/>
           </a:p>
@@ -9108,7 +9104,7 @@
           <a:p>
             <a:fld id="{8204E7FD-169F-464A-8003-B2893D8D8FF1}" type="datetimeFigureOut">
               <a:rPr lang="en-GB" smtClean="0"/>
-              <a:t>15/02/2016</a:t>
+              <a:t>16/02/2016</a:t>
             </a:fld>
             <a:endParaRPr lang="en-GB"/>
           </a:p>
@@ -9724,7 +9720,7 @@
           <a:p>
             <a:fld id="{8204E7FD-169F-464A-8003-B2893D8D8FF1}" type="datetimeFigureOut">
               <a:rPr lang="en-GB" smtClean="0"/>
-              <a:t>15/02/2016</a:t>
+              <a:t>16/02/2016</a:t>
             </a:fld>
             <a:endParaRPr lang="en-GB"/>
           </a:p>
@@ -10002,7 +9998,7 @@
           <a:p>
             <a:fld id="{8204E7FD-169F-464A-8003-B2893D8D8FF1}" type="datetimeFigureOut">
               <a:rPr lang="en-GB" smtClean="0"/>
-              <a:t>15/02/2016</a:t>
+              <a:t>16/02/2016</a:t>
             </a:fld>
             <a:endParaRPr lang="en-GB"/>
           </a:p>
@@ -10612,7 +10608,7 @@
           <a:p>
             <a:fld id="{8204E7FD-169F-464A-8003-B2893D8D8FF1}" type="datetimeFigureOut">
               <a:rPr lang="en-GB" smtClean="0"/>
-              <a:t>15/02/2016</a:t>
+              <a:t>16/02/2016</a:t>
             </a:fld>
             <a:endParaRPr lang="en-GB"/>
           </a:p>
@@ -10939,7 +10935,7 @@
           <a:p>
             <a:fld id="{8204E7FD-169F-464A-8003-B2893D8D8FF1}" type="datetimeFigureOut">
               <a:rPr lang="en-GB" smtClean="0"/>
-              <a:t>15/02/2016</a:t>
+              <a:t>16/02/2016</a:t>
             </a:fld>
             <a:endParaRPr lang="en-GB"/>
           </a:p>
@@ -11116,7 +11112,7 @@
           <a:p>
             <a:fld id="{8204E7FD-169F-464A-8003-B2893D8D8FF1}" type="datetimeFigureOut">
               <a:rPr lang="en-GB" smtClean="0"/>
-              <a:t>15/02/2016</a:t>
+              <a:t>16/02/2016</a:t>
             </a:fld>
             <a:endParaRPr lang="en-GB"/>
           </a:p>
@@ -11354,7 +11350,7 @@
           <a:p>
             <a:fld id="{8204E7FD-169F-464A-8003-B2893D8D8FF1}" type="datetimeFigureOut">
               <a:rPr lang="en-GB" smtClean="0"/>
-              <a:t>15/02/2016</a:t>
+              <a:t>16/02/2016</a:t>
             </a:fld>
             <a:endParaRPr lang="en-GB"/>
           </a:p>
@@ -11554,7 +11550,7 @@
           <a:p>
             <a:fld id="{8204E7FD-169F-464A-8003-B2893D8D8FF1}" type="datetimeFigureOut">
               <a:rPr lang="en-GB" smtClean="0"/>
-              <a:t>15/02/2016</a:t>
+              <a:t>16/02/2016</a:t>
             </a:fld>
             <a:endParaRPr lang="en-GB"/>
           </a:p>
@@ -11837,7 +11833,7 @@
           <a:p>
             <a:fld id="{8204E7FD-169F-464A-8003-B2893D8D8FF1}" type="datetimeFigureOut">
               <a:rPr lang="en-GB" smtClean="0"/>
-              <a:t>15/02/2016</a:t>
+              <a:t>16/02/2016</a:t>
             </a:fld>
             <a:endParaRPr lang="en-GB"/>
           </a:p>
@@ -12110,7 +12106,7 @@
           <a:p>
             <a:fld id="{8204E7FD-169F-464A-8003-B2893D8D8FF1}" type="datetimeFigureOut">
               <a:rPr lang="en-GB" smtClean="0"/>
-              <a:t>15/02/2016</a:t>
+              <a:t>16/02/2016</a:t>
             </a:fld>
             <a:endParaRPr lang="en-GB"/>
           </a:p>
@@ -12484,7 +12480,7 @@
           <a:p>
             <a:fld id="{8204E7FD-169F-464A-8003-B2893D8D8FF1}" type="datetimeFigureOut">
               <a:rPr lang="en-GB" smtClean="0"/>
-              <a:t>15/02/2016</a:t>
+              <a:t>16/02/2016</a:t>
             </a:fld>
             <a:endParaRPr lang="en-GB"/>
           </a:p>
@@ -12639,7 +12635,7 @@
           <a:p>
             <a:fld id="{8204E7FD-169F-464A-8003-B2893D8D8FF1}" type="datetimeFigureOut">
               <a:rPr lang="en-GB" smtClean="0"/>
-              <a:t>15/02/2016</a:t>
+              <a:t>16/02/2016</a:t>
             </a:fld>
             <a:endParaRPr lang="en-GB"/>
           </a:p>
@@ -12764,7 +12760,7 @@
           <a:p>
             <a:fld id="{8204E7FD-169F-464A-8003-B2893D8D8FF1}" type="datetimeFigureOut">
               <a:rPr lang="en-GB" smtClean="0"/>
-              <a:t>15/02/2016</a:t>
+              <a:t>16/02/2016</a:t>
             </a:fld>
             <a:endParaRPr lang="en-GB"/>
           </a:p>
@@ -13049,7 +13045,7 @@
           <a:p>
             <a:fld id="{8204E7FD-169F-464A-8003-B2893D8D8FF1}" type="datetimeFigureOut">
               <a:rPr lang="en-GB" smtClean="0"/>
-              <a:t>15/02/2016</a:t>
+              <a:t>16/02/2016</a:t>
             </a:fld>
             <a:endParaRPr lang="en-GB"/>
           </a:p>
@@ -13373,7 +13369,7 @@
           <a:p>
             <a:fld id="{8204E7FD-169F-464A-8003-B2893D8D8FF1}" type="datetimeFigureOut">
               <a:rPr lang="en-GB" smtClean="0"/>
-              <a:t>15/02/2016</a:t>
+              <a:t>16/02/2016</a:t>
             </a:fld>
             <a:endParaRPr lang="en-GB"/>
           </a:p>
@@ -13587,7 +13583,7 @@
           <a:p>
             <a:fld id="{8204E7FD-169F-464A-8003-B2893D8D8FF1}" type="datetimeFigureOut">
               <a:rPr lang="en-GB" smtClean="0"/>
-              <a:t>15/02/2016</a:t>
+              <a:t>16/02/2016</a:t>
             </a:fld>
             <a:endParaRPr lang="en-GB"/>
           </a:p>
@@ -14285,6 +14281,12 @@
             </a:r>
           </a:p>
           <a:p>
+            <a:r>
+              <a:rPr lang="en-GB" dirty="0" smtClean="0"/>
+              <a:t>Plan Guides</a:t>
+            </a:r>
+          </a:p>
+          <a:p>
             <a:endParaRPr lang="en-GB" dirty="0" smtClean="0"/>
           </a:p>
           <a:p>
@@ -15351,7 +15353,6 @@
               <a:rPr lang="en-GB" dirty="0" smtClean="0"/>
               <a:t>SQLTraining123</a:t>
             </a:r>
-            <a:endParaRPr lang="en-GB" dirty="0" smtClean="0"/>
           </a:p>
           <a:p>
             <a:r>
@@ -16347,13 +16348,21 @@
           <a:p>
             <a:r>
               <a:rPr lang="en-GB" dirty="0" smtClean="0"/>
-              <a:t>Different SET options </a:t>
-            </a:r>
-            <a:r>
-              <a:rPr lang="en-GB" dirty="0" smtClean="0"/>
-              <a:t>– demo later</a:t>
-            </a:r>
-            <a:endParaRPr lang="en-GB" dirty="0" smtClean="0"/>
+              <a:t>Evicted from memory</a:t>
+            </a:r>
+          </a:p>
+          <a:p>
+            <a:pPr lvl="1"/>
+            <a:r>
+              <a:rPr lang="en-GB" dirty="0" smtClean="0"/>
+              <a:t>Based on usage and cost to generate</a:t>
+            </a:r>
+          </a:p>
+          <a:p>
+            <a:r>
+              <a:rPr lang="en-GB" dirty="0" smtClean="0"/>
+              <a:t>Different SET options – next demo</a:t>
+            </a:r>
           </a:p>
           <a:p>
             <a:r>
@@ -18715,6 +18724,10 @@
               <a:t>Enough memory (space to execute the query) – not </a:t>
             </a:r>
             <a:r>
+              <a:rPr lang="en-GB" dirty="0" smtClean="0"/>
+              <a:t>strictly </a:t>
+            </a:r>
+            <a:r>
               <a:rPr lang="en-GB" dirty="0" err="1" smtClean="0"/>
               <a:t>fifo</a:t>
             </a:r>
@@ -18953,13 +18966,33 @@
         </p:nvSpPr>
         <p:spPr/>
         <p:txBody>
-          <a:bodyPr/>
+          <a:bodyPr>
+            <a:normAutofit fontScale="92500" lnSpcReduction="10000"/>
+          </a:bodyPr>
           <a:lstStyle/>
           <a:p>
             <a:r>
               <a:rPr lang="en-GB" dirty="0" smtClean="0"/>
-              <a:t>Calculated method to complete a given task</a:t>
-            </a:r>
+              <a:t>Calculated method to complete a given </a:t>
+            </a:r>
+            <a:r>
+              <a:rPr lang="en-GB" dirty="0" smtClean="0"/>
+              <a:t>task</a:t>
+            </a:r>
+          </a:p>
+          <a:p>
+            <a:r>
+              <a:rPr lang="en-GB" dirty="0" smtClean="0"/>
+              <a:t>Estimates resources required	</a:t>
+            </a:r>
+          </a:p>
+          <a:p>
+            <a:pPr lvl="1"/>
+            <a:r>
+              <a:rPr lang="en-GB" dirty="0" smtClean="0"/>
+              <a:t>Cost (CPU/Memory)</a:t>
+            </a:r>
+            <a:endParaRPr lang="en-GB" dirty="0" smtClean="0"/>
           </a:p>
           <a:p>
             <a:r>

</xml_diff>

<commit_message>
Slides update for header and vm scripts for v7 images
</commit_message>
<xml_diff>
--- a/Slides/3. Query Execution.pptx
+++ b/Slides/3. Query Execution.pptx
@@ -8,8 +8,8 @@
     <p:notesMasterId r:id="rId42"/>
   </p:notesMasterIdLst>
   <p:sldIdLst>
-    <p:sldId id="256" r:id="rId2"/>
-    <p:sldId id="284" r:id="rId3"/>
+    <p:sldId id="305" r:id="rId2"/>
+    <p:sldId id="256" r:id="rId3"/>
     <p:sldId id="304" r:id="rId4"/>
     <p:sldId id="288" r:id="rId5"/>
     <p:sldId id="299" r:id="rId6"/>
@@ -151,8 +151,8 @@
       <p14:sectionLst xmlns:p14="http://schemas.microsoft.com/office/powerpoint/2010/main">
         <p14:section name="Query Plans" id="{83BD849D-C976-4106-9033-75A5B83D4A95}">
           <p14:sldIdLst>
+            <p14:sldId id="305"/>
             <p14:sldId id="256"/>
-            <p14:sldId id="284"/>
             <p14:sldId id="304"/>
             <p14:sldId id="288"/>
             <p14:sldId id="299"/>
@@ -7297,7 +7297,7 @@
           <a:p>
             <a:fld id="{C33E546B-25B4-4054-B726-50ABAEF81226}" type="datetimeFigureOut">
               <a:rPr lang="en-GB" smtClean="0"/>
-              <a:t>16/02/2016</a:t>
+              <a:t>02/03/2016</a:t>
             </a:fld>
             <a:endParaRPr lang="en-GB"/>
           </a:p>
@@ -8132,6 +8132,94 @@
           <a:bodyPr/>
           <a:lstStyle/>
           <a:p>
+            <a:r>
+              <a:rPr lang="en-GB" dirty="0" smtClean="0"/>
+              <a:t>Show DBCC USEROPTIONS()</a:t>
+            </a:r>
+            <a:endParaRPr lang="en-GB" dirty="0"/>
+          </a:p>
+        </p:txBody>
+      </p:sp>
+      <p:sp>
+        <p:nvSpPr>
+          <p:cNvPr id="4" name="Slide Number Placeholder 3"/>
+          <p:cNvSpPr>
+            <a:spLocks noGrp="1"/>
+          </p:cNvSpPr>
+          <p:nvPr>
+            <p:ph type="sldNum" sz="quarter" idx="10"/>
+          </p:nvPr>
+        </p:nvSpPr>
+        <p:spPr/>
+        <p:txBody>
+          <a:bodyPr/>
+          <a:lstStyle/>
+          <a:p>
+            <a:fld id="{C07FE611-E342-4944-80A8-F7B4C421E4DD}" type="slidenum">
+              <a:rPr lang="en-GB" smtClean="0"/>
+              <a:t>28</a:t>
+            </a:fld>
+            <a:endParaRPr lang="en-GB"/>
+          </a:p>
+        </p:txBody>
+      </p:sp>
+    </p:spTree>
+    <p:extLst>
+      <p:ext uri="{BB962C8B-B14F-4D97-AF65-F5344CB8AC3E}">
+        <p14:creationId xmlns:p14="http://schemas.microsoft.com/office/powerpoint/2010/main" val="1133274640"/>
+      </p:ext>
+    </p:extLst>
+  </p:cSld>
+  <p:clrMapOvr>
+    <a:masterClrMapping/>
+  </p:clrMapOvr>
+</p:notes>
+</file>
+
+<file path=ppt/notesSlides/notesSlide6.xml><?xml version="1.0" encoding="utf-8"?>
+<p:notes xmlns:a="http://schemas.openxmlformats.org/drawingml/2006/main" xmlns:r="http://schemas.openxmlformats.org/officeDocument/2006/relationships" xmlns:p="http://schemas.openxmlformats.org/presentationml/2006/main">
+  <p:cSld>
+    <p:spTree>
+      <p:nvGrpSpPr>
+        <p:cNvPr id="1" name=""/>
+        <p:cNvGrpSpPr/>
+        <p:nvPr/>
+      </p:nvGrpSpPr>
+      <p:grpSpPr>
+        <a:xfrm>
+          <a:off x="0" y="0"/>
+          <a:ext cx="0" cy="0"/>
+          <a:chOff x="0" y="0"/>
+          <a:chExt cx="0" cy="0"/>
+        </a:xfrm>
+      </p:grpSpPr>
+      <p:sp>
+        <p:nvSpPr>
+          <p:cNvPr id="2" name="Slide Image Placeholder 1"/>
+          <p:cNvSpPr>
+            <a:spLocks noGrp="1" noRot="1" noChangeAspect="1"/>
+          </p:cNvSpPr>
+          <p:nvPr>
+            <p:ph type="sldImg"/>
+          </p:nvPr>
+        </p:nvSpPr>
+        <p:spPr/>
+      </p:sp>
+      <p:sp>
+        <p:nvSpPr>
+          <p:cNvPr id="3" name="Notes Placeholder 2"/>
+          <p:cNvSpPr>
+            <a:spLocks noGrp="1"/>
+          </p:cNvSpPr>
+          <p:nvPr>
+            <p:ph type="body" idx="1"/>
+          </p:nvPr>
+        </p:nvSpPr>
+        <p:spPr/>
+        <p:txBody>
+          <a:bodyPr/>
+          <a:lstStyle/>
+          <a:p>
             <a:endParaRPr lang="en-GB" dirty="0"/>
           </a:p>
         </p:txBody>
@@ -8172,7 +8260,7 @@
 </p:notes>
 </file>
 
-<file path=ppt/notesSlides/notesSlide6.xml><?xml version="1.0" encoding="utf-8"?>
+<file path=ppt/notesSlides/notesSlide7.xml><?xml version="1.0" encoding="utf-8"?>
 <p:notes xmlns:a="http://schemas.openxmlformats.org/drawingml/2006/main" xmlns:r="http://schemas.openxmlformats.org/officeDocument/2006/relationships" xmlns:p="http://schemas.openxmlformats.org/presentationml/2006/main">
   <p:cSld>
     <p:spTree>
@@ -8485,7 +8573,7 @@
           <a:p>
             <a:fld id="{8204E7FD-169F-464A-8003-B2893D8D8FF1}" type="datetimeFigureOut">
               <a:rPr lang="en-GB" smtClean="0"/>
-              <a:t>16/02/2016</a:t>
+              <a:t>02/03/2016</a:t>
             </a:fld>
             <a:endParaRPr lang="en-GB"/>
           </a:p>
@@ -8826,7 +8914,7 @@
           <a:p>
             <a:fld id="{8204E7FD-169F-464A-8003-B2893D8D8FF1}" type="datetimeFigureOut">
               <a:rPr lang="en-GB" smtClean="0"/>
-              <a:t>16/02/2016</a:t>
+              <a:t>02/03/2016</a:t>
             </a:fld>
             <a:endParaRPr lang="en-GB"/>
           </a:p>
@@ -9104,7 +9192,7 @@
           <a:p>
             <a:fld id="{8204E7FD-169F-464A-8003-B2893D8D8FF1}" type="datetimeFigureOut">
               <a:rPr lang="en-GB" smtClean="0"/>
-              <a:t>16/02/2016</a:t>
+              <a:t>02/03/2016</a:t>
             </a:fld>
             <a:endParaRPr lang="en-GB"/>
           </a:p>
@@ -9720,7 +9808,7 @@
           <a:p>
             <a:fld id="{8204E7FD-169F-464A-8003-B2893D8D8FF1}" type="datetimeFigureOut">
               <a:rPr lang="en-GB" smtClean="0"/>
-              <a:t>16/02/2016</a:t>
+              <a:t>02/03/2016</a:t>
             </a:fld>
             <a:endParaRPr lang="en-GB"/>
           </a:p>
@@ -9998,7 +10086,7 @@
           <a:p>
             <a:fld id="{8204E7FD-169F-464A-8003-B2893D8D8FF1}" type="datetimeFigureOut">
               <a:rPr lang="en-GB" smtClean="0"/>
-              <a:t>16/02/2016</a:t>
+              <a:t>02/03/2016</a:t>
             </a:fld>
             <a:endParaRPr lang="en-GB"/>
           </a:p>
@@ -10608,7 +10696,7 @@
           <a:p>
             <a:fld id="{8204E7FD-169F-464A-8003-B2893D8D8FF1}" type="datetimeFigureOut">
               <a:rPr lang="en-GB" smtClean="0"/>
-              <a:t>16/02/2016</a:t>
+              <a:t>02/03/2016</a:t>
             </a:fld>
             <a:endParaRPr lang="en-GB"/>
           </a:p>
@@ -10935,7 +11023,7 @@
           <a:p>
             <a:fld id="{8204E7FD-169F-464A-8003-B2893D8D8FF1}" type="datetimeFigureOut">
               <a:rPr lang="en-GB" smtClean="0"/>
-              <a:t>16/02/2016</a:t>
+              <a:t>02/03/2016</a:t>
             </a:fld>
             <a:endParaRPr lang="en-GB"/>
           </a:p>
@@ -11112,7 +11200,7 @@
           <a:p>
             <a:fld id="{8204E7FD-169F-464A-8003-B2893D8D8FF1}" type="datetimeFigureOut">
               <a:rPr lang="en-GB" smtClean="0"/>
-              <a:t>16/02/2016</a:t>
+              <a:t>02/03/2016</a:t>
             </a:fld>
             <a:endParaRPr lang="en-GB"/>
           </a:p>
@@ -11350,7 +11438,7 @@
           <a:p>
             <a:fld id="{8204E7FD-169F-464A-8003-B2893D8D8FF1}" type="datetimeFigureOut">
               <a:rPr lang="en-GB" smtClean="0"/>
-              <a:t>16/02/2016</a:t>
+              <a:t>02/03/2016</a:t>
             </a:fld>
             <a:endParaRPr lang="en-GB"/>
           </a:p>
@@ -11550,7 +11638,7 @@
           <a:p>
             <a:fld id="{8204E7FD-169F-464A-8003-B2893D8D8FF1}" type="datetimeFigureOut">
               <a:rPr lang="en-GB" smtClean="0"/>
-              <a:t>16/02/2016</a:t>
+              <a:t>02/03/2016</a:t>
             </a:fld>
             <a:endParaRPr lang="en-GB"/>
           </a:p>
@@ -11833,7 +11921,7 @@
           <a:p>
             <a:fld id="{8204E7FD-169F-464A-8003-B2893D8D8FF1}" type="datetimeFigureOut">
               <a:rPr lang="en-GB" smtClean="0"/>
-              <a:t>16/02/2016</a:t>
+              <a:t>02/03/2016</a:t>
             </a:fld>
             <a:endParaRPr lang="en-GB"/>
           </a:p>
@@ -12106,7 +12194,7 @@
           <a:p>
             <a:fld id="{8204E7FD-169F-464A-8003-B2893D8D8FF1}" type="datetimeFigureOut">
               <a:rPr lang="en-GB" smtClean="0"/>
-              <a:t>16/02/2016</a:t>
+              <a:t>02/03/2016</a:t>
             </a:fld>
             <a:endParaRPr lang="en-GB"/>
           </a:p>
@@ -12480,7 +12568,7 @@
           <a:p>
             <a:fld id="{8204E7FD-169F-464A-8003-B2893D8D8FF1}" type="datetimeFigureOut">
               <a:rPr lang="en-GB" smtClean="0"/>
-              <a:t>16/02/2016</a:t>
+              <a:t>02/03/2016</a:t>
             </a:fld>
             <a:endParaRPr lang="en-GB"/>
           </a:p>
@@ -12635,7 +12723,7 @@
           <a:p>
             <a:fld id="{8204E7FD-169F-464A-8003-B2893D8D8FF1}" type="datetimeFigureOut">
               <a:rPr lang="en-GB" smtClean="0"/>
-              <a:t>16/02/2016</a:t>
+              <a:t>02/03/2016</a:t>
             </a:fld>
             <a:endParaRPr lang="en-GB"/>
           </a:p>
@@ -12760,7 +12848,7 @@
           <a:p>
             <a:fld id="{8204E7FD-169F-464A-8003-B2893D8D8FF1}" type="datetimeFigureOut">
               <a:rPr lang="en-GB" smtClean="0"/>
-              <a:t>16/02/2016</a:t>
+              <a:t>02/03/2016</a:t>
             </a:fld>
             <a:endParaRPr lang="en-GB"/>
           </a:p>
@@ -13045,7 +13133,7 @@
           <a:p>
             <a:fld id="{8204E7FD-169F-464A-8003-B2893D8D8FF1}" type="datetimeFigureOut">
               <a:rPr lang="en-GB" smtClean="0"/>
-              <a:t>16/02/2016</a:t>
+              <a:t>02/03/2016</a:t>
             </a:fld>
             <a:endParaRPr lang="en-GB"/>
           </a:p>
@@ -13369,7 +13457,7 @@
           <a:p>
             <a:fld id="{8204E7FD-169F-464A-8003-B2893D8D8FF1}" type="datetimeFigureOut">
               <a:rPr lang="en-GB" smtClean="0"/>
-              <a:t>16/02/2016</a:t>
+              <a:t>02/03/2016</a:t>
             </a:fld>
             <a:endParaRPr lang="en-GB"/>
           </a:p>
@@ -13583,7 +13671,7 @@
           <a:p>
             <a:fld id="{8204E7FD-169F-464A-8003-B2893D8D8FF1}" type="datetimeFigureOut">
               <a:rPr lang="en-GB" smtClean="0"/>
-              <a:t>16/02/2016</a:t>
+              <a:t>02/03/2016</a:t>
             </a:fld>
             <a:endParaRPr lang="en-GB"/>
           </a:p>
@@ -14150,7 +14238,7 @@
           <a:p>
             <a:r>
               <a:rPr lang="en-GB" dirty="0" smtClean="0"/>
-              <a:t>Query Execution</a:t>
+              <a:t>SQL Bootcamp</a:t>
             </a:r>
             <a:endParaRPr lang="en-GB" dirty="0"/>
           </a:p>
@@ -14171,14 +14259,18 @@
           <a:bodyPr/>
           <a:lstStyle/>
           <a:p>
-            <a:endParaRPr lang="en-GB"/>
+            <a:r>
+              <a:rPr lang="en-GB" dirty="0" smtClean="0"/>
+              <a:t>Query Execution</a:t>
+            </a:r>
+            <a:endParaRPr lang="en-GB" dirty="0"/>
           </a:p>
         </p:txBody>
       </p:sp>
     </p:spTree>
     <p:extLst>
       <p:ext uri="{BB962C8B-B14F-4D97-AF65-F5344CB8AC3E}">
-        <p14:creationId xmlns:p14="http://schemas.microsoft.com/office/powerpoint/2010/main" val="130111604"/>
+        <p14:creationId xmlns:p14="http://schemas.microsoft.com/office/powerpoint/2010/main" val="2847011561"/>
       </p:ext>
     </p:extLst>
   </p:cSld>
@@ -15272,7 +15364,7 @@
             <a:spLocks noGrp="1"/>
           </p:cNvSpPr>
           <p:nvPr>
-            <p:ph type="title"/>
+            <p:ph type="ctrTitle"/>
           </p:nvPr>
         </p:nvSpPr>
         <p:spPr/>
@@ -15282,7 +15374,7 @@
           <a:p>
             <a:r>
               <a:rPr lang="en-GB" dirty="0" smtClean="0"/>
-              <a:t>Welcome</a:t>
+              <a:t>Query Execution</a:t>
             </a:r>
             <a:endParaRPr lang="en-GB" dirty="0"/>
           </a:p>
@@ -15290,118 +15382,27 @@
       </p:sp>
       <p:sp>
         <p:nvSpPr>
-          <p:cNvPr id="3" name="Content Placeholder 2"/>
+          <p:cNvPr id="3" name="Subtitle 2"/>
           <p:cNvSpPr>
             <a:spLocks noGrp="1"/>
           </p:cNvSpPr>
           <p:nvPr>
-            <p:ph idx="1"/>
+            <p:ph type="subTitle" idx="1"/>
           </p:nvPr>
         </p:nvSpPr>
         <p:spPr/>
         <p:txBody>
-          <a:bodyPr>
-            <a:normAutofit/>
-          </a:bodyPr>
+          <a:bodyPr/>
           <a:lstStyle/>
           <a:p>
-            <a:r>
-              <a:rPr lang="en-GB" dirty="0" smtClean="0"/>
-              <a:t>Get a VM:</a:t>
-            </a:r>
-          </a:p>
-          <a:p>
-            <a:pPr lvl="1"/>
-            <a:r>
-              <a:rPr lang="en-GB" dirty="0" smtClean="0"/>
-              <a:t>sabiniotr</a:t>
-            </a:r>
-            <a:r>
-              <a:rPr lang="en-GB" dirty="0" smtClean="0">
-                <a:solidFill>
-                  <a:srgbClr val="FF0000"/>
-                </a:solidFill>
-              </a:rPr>
-              <a:t>XX</a:t>
-            </a:r>
-            <a:r>
-              <a:rPr lang="en-GB" dirty="0" smtClean="0"/>
-              <a:t>.westeurope.cloudapp.azure.com</a:t>
-            </a:r>
-          </a:p>
-          <a:p>
-            <a:r>
-              <a:rPr lang="en-GB" dirty="0" smtClean="0"/>
-              <a:t>Login</a:t>
-            </a:r>
-          </a:p>
-          <a:p>
-            <a:pPr lvl="1"/>
-            <a:r>
-              <a:rPr lang="en-GB" dirty="0" smtClean="0"/>
-              <a:t>.\</a:t>
-            </a:r>
-            <a:r>
-              <a:rPr lang="en-GB" dirty="0" err="1" smtClean="0"/>
-              <a:t>SQLTraining</a:t>
-            </a:r>
-            <a:endParaRPr lang="en-GB" dirty="0" smtClean="0"/>
-          </a:p>
-          <a:p>
-            <a:pPr lvl="1"/>
-            <a:r>
-              <a:rPr lang="en-GB" dirty="0" smtClean="0"/>
-              <a:t>SQLTraining123</a:t>
-            </a:r>
-          </a:p>
-          <a:p>
-            <a:r>
-              <a:rPr lang="en-GB" dirty="0" err="1" smtClean="0"/>
-              <a:t>Wifi</a:t>
-            </a:r>
-            <a:endParaRPr lang="en-GB" dirty="0" smtClean="0"/>
-          </a:p>
-          <a:p>
-            <a:pPr lvl="1"/>
-            <a:r>
-              <a:rPr lang="en-GB" dirty="0"/>
-              <a:t>U</a:t>
-            </a:r>
-            <a:r>
-              <a:rPr lang="en-GB" dirty="0" smtClean="0"/>
-              <a:t>sername</a:t>
-            </a:r>
-            <a:r>
-              <a:rPr lang="en-GB" dirty="0"/>
-              <a:t>:	huddle</a:t>
-            </a:r>
-          </a:p>
-          <a:p>
-            <a:pPr lvl="1"/>
-            <a:r>
-              <a:rPr lang="en-GB" dirty="0" smtClean="0"/>
-              <a:t>Password</a:t>
-            </a:r>
-            <a:r>
-              <a:rPr lang="en-GB" dirty="0"/>
-              <a:t>:	</a:t>
-            </a:r>
-            <a:r>
-              <a:rPr lang="en-GB" dirty="0" err="1"/>
-              <a:t>wCKEgk</a:t>
-            </a:r>
-            <a:endParaRPr lang="en-GB" dirty="0"/>
-          </a:p>
-          <a:p>
-            <a:pPr lvl="1"/>
-            <a:endParaRPr lang="en-GB" dirty="0" smtClean="0"/>
+            <a:endParaRPr lang="en-GB"/>
           </a:p>
         </p:txBody>
       </p:sp>
     </p:spTree>
     <p:extLst>
       <p:ext uri="{BB962C8B-B14F-4D97-AF65-F5344CB8AC3E}">
-        <p14:creationId xmlns:p14="http://schemas.microsoft.com/office/powerpoint/2010/main" val="2755014549"/>
+        <p14:creationId xmlns:p14="http://schemas.microsoft.com/office/powerpoint/2010/main" val="130111604"/>
       </p:ext>
     </p:extLst>
   </p:cSld>
@@ -18721,11 +18722,7 @@
             <a:pPr lvl="1"/>
             <a:r>
               <a:rPr lang="en-GB" dirty="0" smtClean="0"/>
-              <a:t>Enough memory (space to execute the query) – not </a:t>
-            </a:r>
-            <a:r>
-              <a:rPr lang="en-GB" dirty="0" smtClean="0"/>
-              <a:t>strictly </a:t>
+              <a:t>Enough memory (space to execute the query) – not strictly </a:t>
             </a:r>
             <a:r>
               <a:rPr lang="en-GB" dirty="0" err="1" smtClean="0"/>
@@ -18973,11 +18970,7 @@
           <a:p>
             <a:r>
               <a:rPr lang="en-GB" dirty="0" smtClean="0"/>
-              <a:t>Calculated method to complete a given </a:t>
-            </a:r>
-            <a:r>
-              <a:rPr lang="en-GB" dirty="0" smtClean="0"/>
-              <a:t>task</a:t>
+              <a:t>Calculated method to complete a given task</a:t>
             </a:r>
           </a:p>
           <a:p>
@@ -18992,7 +18985,6 @@
               <a:rPr lang="en-GB" dirty="0" smtClean="0"/>
               <a:t>Cost (CPU/Memory)</a:t>
             </a:r>
-            <a:endParaRPr lang="en-GB" dirty="0" smtClean="0"/>
           </a:p>
           <a:p>
             <a:r>

</xml_diff>